<commit_message>
ISS-55: Fix bug related to placeholders parsing
</commit_message>
<xml_diff>
--- a/test/SlideXML.Tests/Resource/014.pptx
+++ b/test/SlideXML.Tests/Resource/014.pptx
@@ -3,12 +3,16 @@
 <p:presentation xmlns:a="http://schemas.openxmlformats.org/drawingml/2006/main" xmlns:r="http://schemas.openxmlformats.org/officeDocument/2006/relationships" xmlns:p="http://schemas.openxmlformats.org/presentationml/2006/main" strictFirstAndLastChars="0" saveSubsetFonts="1" autoCompressPictures="0">
   <p:sldMasterIdLst>
     <p:sldMasterId id="2147483659" r:id="rId1"/>
+    <p:sldMasterId id="2147483660" r:id="rId2"/>
+    <p:sldMasterId id="2147483662" r:id="rId3"/>
   </p:sldMasterIdLst>
   <p:notesMasterIdLst>
-    <p:notesMasterId r:id="rId3"/>
+    <p:notesMasterId r:id="rId7"/>
   </p:notesMasterIdLst>
   <p:sldIdLst>
-    <p:sldId id="257" r:id="rId2"/>
+    <p:sldId id="257" r:id="rId4"/>
+    <p:sldId id="256" r:id="rId5"/>
+    <p:sldId id="805" r:id="rId6"/>
   </p:sldIdLst>
   <p:sldSz cx="9144000" cy="5143500" type="screen16x9"/>
   <p:notesSz cx="6858000" cy="9144000"/>
@@ -792,6 +796,305 @@
 </p:notes>
 </file>
 
+<file path=ppt/notesSlides/notesSlide2.xml><?xml version="1.0" encoding="utf-8"?>
+<p:notes xmlns:a="http://schemas.openxmlformats.org/drawingml/2006/main" xmlns:r="http://schemas.openxmlformats.org/officeDocument/2006/relationships" xmlns:p="http://schemas.openxmlformats.org/presentationml/2006/main">
+  <p:cSld>
+    <p:spTree>
+      <p:nvGrpSpPr>
+        <p:cNvPr id="1" name=""/>
+        <p:cNvGrpSpPr/>
+        <p:nvPr/>
+      </p:nvGrpSpPr>
+      <p:grpSpPr>
+        <a:xfrm>
+          <a:off x="0" y="0"/>
+          <a:ext cx="0" cy="0"/>
+          <a:chOff x="0" y="0"/>
+          <a:chExt cx="0" cy="0"/>
+        </a:xfrm>
+      </p:grpSpPr>
+      <p:sp>
+        <p:nvSpPr>
+          <p:cNvPr id="2" name="Slide Image Placeholder 1"/>
+          <p:cNvSpPr>
+            <a:spLocks noGrp="1" noRot="1" noChangeAspect="1"/>
+          </p:cNvSpPr>
+          <p:nvPr>
+            <p:ph type="sldImg"/>
+          </p:nvPr>
+        </p:nvSpPr>
+        <p:spPr>
+          <a:xfrm>
+            <a:off x="746125" y="739775"/>
+            <a:ext cx="5226050" cy="3695700"/>
+          </a:xfrm>
+        </p:spPr>
+      </p:sp>
+      <p:sp>
+        <p:nvSpPr>
+          <p:cNvPr id="3" name="Notes Placeholder 2"/>
+          <p:cNvSpPr>
+            <a:spLocks noGrp="1"/>
+          </p:cNvSpPr>
+          <p:nvPr>
+            <p:ph type="body" idx="1"/>
+          </p:nvPr>
+        </p:nvSpPr>
+        <p:spPr/>
+        <p:txBody>
+          <a:bodyPr>
+            <a:normAutofit/>
+          </a:bodyPr>
+          <a:lstStyle/>
+          <a:p>
+            <a:endParaRPr lang="en-GB" dirty="0"/>
+          </a:p>
+        </p:txBody>
+      </p:sp>
+      <p:sp>
+        <p:nvSpPr>
+          <p:cNvPr id="4" name="Slide Number Placeholder 3"/>
+          <p:cNvSpPr>
+            <a:spLocks noGrp="1"/>
+          </p:cNvSpPr>
+          <p:nvPr>
+            <p:ph type="sldNum" sz="quarter" idx="10"/>
+          </p:nvPr>
+        </p:nvSpPr>
+        <p:spPr/>
+        <p:txBody>
+          <a:bodyPr/>
+          <a:lstStyle/>
+          <a:p>
+            <a:pPr marL="0" marR="0" lvl="0" indent="0" algn="r" defTabSz="1018824" rtl="0" eaLnBrk="1" fontAlgn="auto" latinLnBrk="0" hangingPunct="1">
+              <a:lnSpc>
+                <a:spcPct val="100000"/>
+              </a:lnSpc>
+              <a:spcBef>
+                <a:spcPts val="0"/>
+              </a:spcBef>
+              <a:spcAft>
+                <a:spcPts val="0"/>
+              </a:spcAft>
+              <a:buClrTx/>
+              <a:buSzTx/>
+              <a:buFontTx/>
+              <a:buNone/>
+              <a:tabLst/>
+              <a:defRPr/>
+            </a:pPr>
+            <a:fld id="{6B2C06E8-48A6-4E03-8711-C45C0018F498}" type="slidenum">
+              <a:rPr kumimoji="0" lang="en-GB" sz="1200" b="0" i="0" u="none" strike="noStrike" kern="1200" cap="none" spc="0" normalizeH="0" baseline="0" noProof="0" smtClean="0">
+                <a:ln>
+                  <a:noFill/>
+                </a:ln>
+                <a:solidFill>
+                  <a:prstClr val="black"/>
+                </a:solidFill>
+                <a:effectLst/>
+                <a:uLnTx/>
+                <a:uFillTx/>
+                <a:latin typeface="Calibri"/>
+                <a:ea typeface="+mn-ea"/>
+                <a:cs typeface="+mn-cs"/>
+              </a:rPr>
+              <a:pPr marL="0" marR="0" lvl="0" indent="0" algn="r" defTabSz="1018824" rtl="0" eaLnBrk="1" fontAlgn="auto" latinLnBrk="0" hangingPunct="1">
+                <a:lnSpc>
+                  <a:spcPct val="100000"/>
+                </a:lnSpc>
+                <a:spcBef>
+                  <a:spcPts val="0"/>
+                </a:spcBef>
+                <a:spcAft>
+                  <a:spcPts val="0"/>
+                </a:spcAft>
+                <a:buClrTx/>
+                <a:buSzTx/>
+                <a:buFontTx/>
+                <a:buNone/>
+                <a:tabLst/>
+                <a:defRPr/>
+              </a:pPr>
+              <a:t>2</a:t>
+            </a:fld>
+            <a:endParaRPr kumimoji="0" lang="en-GB" sz="1200" b="0" i="0" u="none" strike="noStrike" kern="1200" cap="none" spc="0" normalizeH="0" baseline="0" noProof="0" dirty="0">
+              <a:ln>
+                <a:noFill/>
+              </a:ln>
+              <a:solidFill>
+                <a:prstClr val="black"/>
+              </a:solidFill>
+              <a:effectLst/>
+              <a:uLnTx/>
+              <a:uFillTx/>
+              <a:latin typeface="Calibri"/>
+              <a:ea typeface="+mn-ea"/>
+              <a:cs typeface="+mn-cs"/>
+            </a:endParaRPr>
+          </a:p>
+        </p:txBody>
+      </p:sp>
+    </p:spTree>
+  </p:cSld>
+  <p:clrMapOvr>
+    <a:masterClrMapping/>
+  </p:clrMapOvr>
+</p:notes>
+</file>
+
+<file path=ppt/notesSlides/notesSlide3.xml><?xml version="1.0" encoding="utf-8"?>
+<p:notes xmlns:a="http://schemas.openxmlformats.org/drawingml/2006/main" xmlns:r="http://schemas.openxmlformats.org/officeDocument/2006/relationships" xmlns:p="http://schemas.openxmlformats.org/presentationml/2006/main">
+  <p:cSld>
+    <p:spTree>
+      <p:nvGrpSpPr>
+        <p:cNvPr id="1" name=""/>
+        <p:cNvGrpSpPr/>
+        <p:nvPr/>
+      </p:nvGrpSpPr>
+      <p:grpSpPr>
+        <a:xfrm>
+          <a:off x="0" y="0"/>
+          <a:ext cx="0" cy="0"/>
+          <a:chOff x="0" y="0"/>
+          <a:chExt cx="0" cy="0"/>
+        </a:xfrm>
+      </p:grpSpPr>
+      <p:sp>
+        <p:nvSpPr>
+          <p:cNvPr id="2" name="Slide Image Placeholder 1"/>
+          <p:cNvSpPr>
+            <a:spLocks noGrp="1" noRot="1" noChangeAspect="1"/>
+          </p:cNvSpPr>
+          <p:nvPr>
+            <p:ph type="sldImg"/>
+          </p:nvPr>
+        </p:nvSpPr>
+        <p:spPr>
+          <a:xfrm>
+            <a:off x="381000" y="685800"/>
+            <a:ext cx="6096000" cy="3429000"/>
+          </a:xfrm>
+        </p:spPr>
+      </p:sp>
+      <p:sp>
+        <p:nvSpPr>
+          <p:cNvPr id="3" name="Notes Placeholder 2"/>
+          <p:cNvSpPr>
+            <a:spLocks noGrp="1"/>
+          </p:cNvSpPr>
+          <p:nvPr>
+            <p:ph type="body" idx="1"/>
+          </p:nvPr>
+        </p:nvSpPr>
+        <p:spPr/>
+        <p:txBody>
+          <a:bodyPr/>
+          <a:lstStyle/>
+          <a:p>
+            <a:endParaRPr lang="en-GB" dirty="0">
+              <a:solidFill>
+                <a:srgbClr val="000000"/>
+              </a:solidFill>
+            </a:endParaRPr>
+          </a:p>
+        </p:txBody>
+      </p:sp>
+      <p:sp>
+        <p:nvSpPr>
+          <p:cNvPr id="4" name="Slide Number Placeholder 3"/>
+          <p:cNvSpPr>
+            <a:spLocks noGrp="1"/>
+          </p:cNvSpPr>
+          <p:nvPr>
+            <p:ph type="sldNum" sz="quarter" idx="10"/>
+          </p:nvPr>
+        </p:nvSpPr>
+        <p:spPr/>
+        <p:txBody>
+          <a:bodyPr/>
+          <a:lstStyle/>
+          <a:p>
+            <a:pPr marL="0" marR="0" lvl="0" indent="0" algn="r" defTabSz="914400" rtl="0" eaLnBrk="1" fontAlgn="auto" latinLnBrk="0" hangingPunct="1">
+              <a:lnSpc>
+                <a:spcPct val="100000"/>
+              </a:lnSpc>
+              <a:spcBef>
+                <a:spcPts val="0"/>
+              </a:spcBef>
+              <a:spcAft>
+                <a:spcPts val="0"/>
+              </a:spcAft>
+              <a:buClrTx/>
+              <a:buSzTx/>
+              <a:buFontTx/>
+              <a:buNone/>
+              <a:tabLst/>
+              <a:defRPr/>
+            </a:pPr>
+            <a:fld id="{AB66039F-B480-4862-BA08-5CFE87518D65}" type="slidenum">
+              <a:rPr kumimoji="0" lang="en-GB" sz="1200" b="0" i="0" u="none" strike="noStrike" kern="1200" cap="none" spc="0" normalizeH="0" baseline="0" noProof="0" smtClean="0">
+                <a:ln>
+                  <a:noFill/>
+                </a:ln>
+                <a:solidFill>
+                  <a:srgbClr val="000000"/>
+                </a:solidFill>
+                <a:effectLst/>
+                <a:uLnTx/>
+                <a:uFillTx/>
+                <a:latin typeface="Arial" pitchFamily="34" charset="0"/>
+                <a:ea typeface="+mn-ea"/>
+                <a:cs typeface="Arial" pitchFamily="34" charset="0"/>
+              </a:rPr>
+              <a:pPr marL="0" marR="0" lvl="0" indent="0" algn="r" defTabSz="914400" rtl="0" eaLnBrk="1" fontAlgn="auto" latinLnBrk="0" hangingPunct="1">
+                <a:lnSpc>
+                  <a:spcPct val="100000"/>
+                </a:lnSpc>
+                <a:spcBef>
+                  <a:spcPts val="0"/>
+                </a:spcBef>
+                <a:spcAft>
+                  <a:spcPts val="0"/>
+                </a:spcAft>
+                <a:buClrTx/>
+                <a:buSzTx/>
+                <a:buFontTx/>
+                <a:buNone/>
+                <a:tabLst/>
+                <a:defRPr/>
+              </a:pPr>
+              <a:t>3</a:t>
+            </a:fld>
+            <a:endParaRPr kumimoji="0" lang="en-GB" sz="1200" b="0" i="0" u="none" strike="noStrike" kern="1200" cap="none" spc="0" normalizeH="0" baseline="0" noProof="0" dirty="0">
+              <a:ln>
+                <a:noFill/>
+              </a:ln>
+              <a:solidFill>
+                <a:srgbClr val="000000"/>
+              </a:solidFill>
+              <a:effectLst/>
+              <a:uLnTx/>
+              <a:uFillTx/>
+              <a:latin typeface="Arial" pitchFamily="34" charset="0"/>
+              <a:ea typeface="+mn-ea"/>
+              <a:cs typeface="Arial" pitchFamily="34" charset="0"/>
+            </a:endParaRPr>
+          </a:p>
+        </p:txBody>
+      </p:sp>
+    </p:spTree>
+    <p:extLst>
+      <p:ext uri="{BB962C8B-B14F-4D97-AF65-F5344CB8AC3E}">
+        <p14:creationId xmlns:p14="http://schemas.microsoft.com/office/powerpoint/2010/main" val="215421185"/>
+      </p:ext>
+    </p:extLst>
+  </p:cSld>
+  <p:clrMapOvr>
+    <a:masterClrMapping/>
+  </p:clrMapOvr>
+</p:notes>
+</file>
+
 <file path=ppt/slideLayouts/slideLayout1.xml><?xml version="1.0" encoding="utf-8"?>
 <p:sldLayout xmlns:a="http://schemas.openxmlformats.org/drawingml/2006/main" xmlns:r="http://schemas.openxmlformats.org/officeDocument/2006/relationships" xmlns:p="http://schemas.openxmlformats.org/presentationml/2006/main" matchingName="Title and body" type="tx">
   <p:cSld name="TITLE_AND_BODY">
@@ -1170,6 +1473,750 @@
         </p:txBody>
       </p:sp>
     </p:spTree>
+  </p:cSld>
+  <p:clrMapOvr>
+    <a:masterClrMapping/>
+  </p:clrMapOvr>
+</p:sldLayout>
+</file>
+
+<file path=ppt/slideLayouts/slideLayout2.xml><?xml version="1.0" encoding="utf-8"?>
+<p:sldLayout xmlns:a="http://schemas.openxmlformats.org/drawingml/2006/main" xmlns:r="http://schemas.openxmlformats.org/officeDocument/2006/relationships" xmlns:p="http://schemas.openxmlformats.org/presentationml/2006/main" showMasterSp="0" preserve="1">
+  <p:cSld name="Cover Slide">
+    <p:spTree>
+      <p:nvGrpSpPr>
+        <p:cNvPr id="1" name=""/>
+        <p:cNvGrpSpPr/>
+        <p:nvPr/>
+      </p:nvGrpSpPr>
+      <p:grpSpPr>
+        <a:xfrm>
+          <a:off x="0" y="0"/>
+          <a:ext cx="0" cy="0"/>
+          <a:chOff x="0" y="0"/>
+          <a:chExt cx="0" cy="0"/>
+        </a:xfrm>
+      </p:grpSpPr>
+      <p:sp>
+        <p:nvSpPr>
+          <p:cNvPr id="15" name="Title 1"/>
+          <p:cNvSpPr>
+            <a:spLocks noGrp="1"/>
+          </p:cNvSpPr>
+          <p:nvPr>
+            <p:ph type="ctrTitle" hasCustomPrompt="1"/>
+          </p:nvPr>
+        </p:nvSpPr>
+        <p:spPr bwMode="white">
+          <a:xfrm>
+            <a:off x="1870366" y="756397"/>
+            <a:ext cx="5403272" cy="605118"/>
+          </a:xfrm>
+        </p:spPr>
+        <p:txBody>
+          <a:bodyPr anchor="t" anchorCtr="0">
+            <a:noAutofit/>
+          </a:bodyPr>
+          <a:lstStyle>
+            <a:lvl1pPr>
+              <a:lnSpc>
+                <a:spcPct val="90000"/>
+              </a:lnSpc>
+              <a:defRPr sz="2177" b="1" i="1" baseline="0">
+                <a:solidFill>
+                  <a:schemeClr val="bg1"/>
+                </a:solidFill>
+              </a:defRPr>
+            </a:lvl1pPr>
+          </a:lstStyle>
+          <a:p>
+            <a:r>
+              <a:rPr lang="en-GB" noProof="0" dirty="0"/>
+              <a:t>Click to add the report’s main title</a:t>
+            </a:r>
+          </a:p>
+        </p:txBody>
+      </p:sp>
+      <p:sp>
+        <p:nvSpPr>
+          <p:cNvPr id="18" name="Subtitle 2"/>
+          <p:cNvSpPr>
+            <a:spLocks noGrp="1"/>
+          </p:cNvSpPr>
+          <p:nvPr>
+            <p:ph type="subTitle" idx="1" hasCustomPrompt="1"/>
+          </p:nvPr>
+        </p:nvSpPr>
+        <p:spPr bwMode="white">
+          <a:xfrm>
+            <a:off x="1870365" y="1462368"/>
+            <a:ext cx="5403272" cy="605118"/>
+          </a:xfrm>
+        </p:spPr>
+        <p:txBody>
+          <a:bodyPr>
+            <a:noAutofit/>
+          </a:bodyPr>
+          <a:lstStyle>
+            <a:lvl1pPr marL="0" indent="0" algn="l">
+              <a:lnSpc>
+                <a:spcPct val="90000"/>
+              </a:lnSpc>
+              <a:spcAft>
+                <a:spcPts val="0"/>
+              </a:spcAft>
+              <a:buNone/>
+              <a:defRPr sz="2177" baseline="0">
+                <a:solidFill>
+                  <a:schemeClr val="bg1"/>
+                </a:solidFill>
+                <a:latin typeface="+mj-lt"/>
+              </a:defRPr>
+            </a:lvl1pPr>
+            <a:lvl2pPr marL="0" indent="0" algn="l">
+              <a:buNone/>
+              <a:defRPr sz="1360">
+                <a:solidFill>
+                  <a:schemeClr val="bg1"/>
+                </a:solidFill>
+                <a:latin typeface="+mj-lt"/>
+              </a:defRPr>
+            </a:lvl2pPr>
+            <a:lvl3pPr marL="346461" indent="0" algn="l">
+              <a:buNone/>
+              <a:defRPr sz="1360">
+                <a:solidFill>
+                  <a:schemeClr val="bg1"/>
+                </a:solidFill>
+                <a:latin typeface="+mj-lt"/>
+              </a:defRPr>
+            </a:lvl3pPr>
+            <a:lvl4pPr marL="692923" indent="0" algn="l">
+              <a:buNone/>
+              <a:defRPr sz="1360">
+                <a:solidFill>
+                  <a:schemeClr val="bg1"/>
+                </a:solidFill>
+                <a:latin typeface="+mj-lt"/>
+              </a:defRPr>
+            </a:lvl4pPr>
+            <a:lvl5pPr marL="1039385" indent="0" algn="l">
+              <a:buNone/>
+              <a:defRPr sz="1360">
+                <a:solidFill>
+                  <a:schemeClr val="bg1"/>
+                </a:solidFill>
+                <a:latin typeface="+mj-lt"/>
+              </a:defRPr>
+            </a:lvl5pPr>
+            <a:lvl6pPr marL="1385847" indent="0" algn="l">
+              <a:buNone/>
+              <a:defRPr sz="1360">
+                <a:solidFill>
+                  <a:schemeClr val="bg1"/>
+                </a:solidFill>
+                <a:latin typeface="+mj-lt"/>
+              </a:defRPr>
+            </a:lvl6pPr>
+            <a:lvl7pPr marL="1732309" indent="0" algn="l">
+              <a:buNone/>
+              <a:defRPr sz="1360">
+                <a:solidFill>
+                  <a:schemeClr val="bg1"/>
+                </a:solidFill>
+                <a:latin typeface="+mj-lt"/>
+              </a:defRPr>
+            </a:lvl7pPr>
+            <a:lvl8pPr marL="2078770" indent="0" algn="l">
+              <a:buNone/>
+              <a:defRPr sz="1360">
+                <a:solidFill>
+                  <a:schemeClr val="bg1"/>
+                </a:solidFill>
+                <a:latin typeface="+mj-lt"/>
+              </a:defRPr>
+            </a:lvl8pPr>
+            <a:lvl9pPr marL="2425232" indent="0" algn="l">
+              <a:buNone/>
+              <a:defRPr sz="1360">
+                <a:solidFill>
+                  <a:schemeClr val="bg1"/>
+                </a:solidFill>
+                <a:latin typeface="+mj-lt"/>
+              </a:defRPr>
+            </a:lvl9pPr>
+          </a:lstStyle>
+          <a:p>
+            <a:r>
+              <a:rPr lang="en-GB" noProof="0" dirty="0"/>
+              <a:t>Subtitle and date (move higher if title is only one line)</a:t>
+            </a:r>
+          </a:p>
+        </p:txBody>
+      </p:sp>
+      <p:sp>
+        <p:nvSpPr>
+          <p:cNvPr id="21" name="Text Placeholder 31"/>
+          <p:cNvSpPr>
+            <a:spLocks noGrp="1"/>
+          </p:cNvSpPr>
+          <p:nvPr>
+            <p:ph type="body" sz="quarter" idx="10" hasCustomPrompt="1"/>
+          </p:nvPr>
+        </p:nvSpPr>
+        <p:spPr bwMode="white">
+          <a:xfrm>
+            <a:off x="1870364" y="352986"/>
+            <a:ext cx="4156363" cy="100853"/>
+          </a:xfrm>
+        </p:spPr>
+        <p:txBody>
+          <a:bodyPr/>
+          <a:lstStyle>
+            <a:lvl1pPr>
+              <a:defRPr sz="816">
+                <a:solidFill>
+                  <a:schemeClr val="bg1"/>
+                </a:solidFill>
+                <a:latin typeface="Arial" pitchFamily="34" charset="0"/>
+                <a:cs typeface="Arial" pitchFamily="34" charset="0"/>
+              </a:defRPr>
+            </a:lvl1pPr>
+            <a:lvl2pPr>
+              <a:defRPr sz="748">
+                <a:solidFill>
+                  <a:schemeClr val="bg1"/>
+                </a:solidFill>
+                <a:latin typeface="Arial" pitchFamily="34" charset="0"/>
+                <a:cs typeface="Arial" pitchFamily="34" charset="0"/>
+              </a:defRPr>
+            </a:lvl2pPr>
+            <a:lvl3pPr>
+              <a:defRPr sz="748">
+                <a:solidFill>
+                  <a:schemeClr val="bg1"/>
+                </a:solidFill>
+                <a:latin typeface="Arial" pitchFamily="34" charset="0"/>
+                <a:cs typeface="Arial" pitchFamily="34" charset="0"/>
+              </a:defRPr>
+            </a:lvl3pPr>
+            <a:lvl4pPr>
+              <a:defRPr sz="748">
+                <a:solidFill>
+                  <a:schemeClr val="bg1"/>
+                </a:solidFill>
+                <a:latin typeface="Arial" pitchFamily="34" charset="0"/>
+                <a:cs typeface="Arial" pitchFamily="34" charset="0"/>
+              </a:defRPr>
+            </a:lvl4pPr>
+            <a:lvl5pPr>
+              <a:defRPr sz="748">
+                <a:solidFill>
+                  <a:schemeClr val="bg1"/>
+                </a:solidFill>
+                <a:latin typeface="Arial" pitchFamily="34" charset="0"/>
+                <a:cs typeface="Arial" pitchFamily="34" charset="0"/>
+              </a:defRPr>
+            </a:lvl5pPr>
+          </a:lstStyle>
+          <a:p>
+            <a:pPr lvl="0"/>
+            <a:r>
+              <a:rPr lang="en-GB" noProof="0" dirty="0" err="1"/>
+              <a:t>www.pwc.com</a:t>
+            </a:r>
+            <a:endParaRPr lang="en-GB" noProof="0" dirty="0"/>
+          </a:p>
+        </p:txBody>
+      </p:sp>
+    </p:spTree>
+    <p:extLst>
+      <p:ext uri="{BB962C8B-B14F-4D97-AF65-F5344CB8AC3E}">
+        <p14:creationId xmlns:p14="http://schemas.microsoft.com/office/powerpoint/2010/main" val="1375116177"/>
+      </p:ext>
+    </p:extLst>
+  </p:cSld>
+  <p:clrMapOvr>
+    <a:masterClrMapping/>
+  </p:clrMapOvr>
+</p:sldLayout>
+</file>
+
+<file path=ppt/slideLayouts/slideLayout3.xml><?xml version="1.0" encoding="utf-8"?>
+<p:sldLayout xmlns:a="http://schemas.openxmlformats.org/drawingml/2006/main" xmlns:r="http://schemas.openxmlformats.org/officeDocument/2006/relationships" xmlns:p="http://schemas.openxmlformats.org/presentationml/2006/main" userDrawn="1">
+  <p:cSld name="Wordslide with Quotes - 3 Panes">
+    <p:spTree>
+      <p:nvGrpSpPr>
+        <p:cNvPr id="1" name=""/>
+        <p:cNvGrpSpPr/>
+        <p:nvPr/>
+      </p:nvGrpSpPr>
+      <p:grpSpPr>
+        <a:xfrm>
+          <a:off x="0" y="0"/>
+          <a:ext cx="0" cy="0"/>
+          <a:chOff x="0" y="0"/>
+          <a:chExt cx="0" cy="0"/>
+        </a:xfrm>
+      </p:grpSpPr>
+      <p:sp>
+        <p:nvSpPr>
+          <p:cNvPr id="2" name="Title 1"/>
+          <p:cNvSpPr>
+            <a:spLocks noGrp="1"/>
+          </p:cNvSpPr>
+          <p:nvPr>
+            <p:ph type="title"/>
+          </p:nvPr>
+        </p:nvSpPr>
+        <p:spPr/>
+        <p:txBody>
+          <a:bodyPr/>
+          <a:lstStyle/>
+          <a:p>
+            <a:r>
+              <a:rPr lang="en-US" dirty="0"/>
+              <a:t>Click to edit Master title style</a:t>
+            </a:r>
+            <a:endParaRPr lang="en-GB" dirty="0"/>
+          </a:p>
+        </p:txBody>
+      </p:sp>
+      <p:sp>
+        <p:nvSpPr>
+          <p:cNvPr id="3" name="Text Placeholder 9"/>
+          <p:cNvSpPr>
+            <a:spLocks noGrp="1"/>
+          </p:cNvSpPr>
+          <p:nvPr>
+            <p:ph type="body" sz="quarter" idx="12"/>
+          </p:nvPr>
+        </p:nvSpPr>
+        <p:spPr>
+          <a:xfrm>
+            <a:off x="483577" y="870347"/>
+            <a:ext cx="4088422" cy="166199"/>
+          </a:xfrm>
+        </p:spPr>
+        <p:txBody>
+          <a:bodyPr lIns="0"/>
+          <a:lstStyle>
+            <a:lvl1pPr marL="0" indent="0" algn="l">
+              <a:spcBef>
+                <a:spcPts val="0"/>
+              </a:spcBef>
+              <a:spcAft>
+                <a:spcPts val="0"/>
+              </a:spcAft>
+              <a:buNone/>
+              <a:defRPr b="1">
+                <a:solidFill>
+                  <a:schemeClr val="accent1"/>
+                </a:solidFill>
+              </a:defRPr>
+            </a:lvl1pPr>
+          </a:lstStyle>
+          <a:p>
+            <a:pPr lvl="0"/>
+            <a:r>
+              <a:rPr lang="en-US" dirty="0"/>
+              <a:t>Click to edit Master text styles</a:t>
+            </a:r>
+          </a:p>
+        </p:txBody>
+      </p:sp>
+      <p:sp>
+        <p:nvSpPr>
+          <p:cNvPr id="5" name="Content Placeholder 5"/>
+          <p:cNvSpPr>
+            <a:spLocks noGrp="1"/>
+          </p:cNvSpPr>
+          <p:nvPr>
+            <p:ph sz="quarter" idx="10"/>
+          </p:nvPr>
+        </p:nvSpPr>
+        <p:spPr>
+          <a:xfrm>
+            <a:off x="483577" y="1145747"/>
+            <a:ext cx="4080738" cy="422167"/>
+          </a:xfrm>
+        </p:spPr>
+        <p:txBody>
+          <a:bodyPr rIns="0"/>
+          <a:lstStyle>
+            <a:lvl1pPr marL="184643" indent="-184643">
+              <a:defRPr/>
+            </a:lvl1pPr>
+            <a:lvl2pPr marL="436165" indent="-186928">
+              <a:defRPr/>
+            </a:lvl2pPr>
+            <a:lvl3pPr marL="436330" indent="-190139">
+              <a:defRPr/>
+            </a:lvl3pPr>
+            <a:lvl4pPr marL="436330" indent="-190139">
+              <a:defRPr/>
+            </a:lvl4pPr>
+            <a:lvl5pPr marL="436330" indent="-190139">
+              <a:defRPr/>
+            </a:lvl5pPr>
+          </a:lstStyle>
+          <a:p>
+            <a:pPr lvl="0"/>
+            <a:r>
+              <a:rPr lang="en-US" dirty="0"/>
+              <a:t>Click to edit Master text styles</a:t>
+            </a:r>
+          </a:p>
+          <a:p>
+            <a:pPr lvl="1"/>
+            <a:r>
+              <a:rPr lang="en-US" dirty="0"/>
+              <a:t>Second level</a:t>
+            </a:r>
+          </a:p>
+        </p:txBody>
+      </p:sp>
+      <p:sp>
+        <p:nvSpPr>
+          <p:cNvPr id="7" name="Content Placeholder 5"/>
+          <p:cNvSpPr>
+            <a:spLocks noGrp="1"/>
+          </p:cNvSpPr>
+          <p:nvPr>
+            <p:ph sz="quarter" idx="13" hasCustomPrompt="1"/>
+          </p:nvPr>
+        </p:nvSpPr>
+        <p:spPr>
+          <a:xfrm>
+            <a:off x="5001231" y="873371"/>
+            <a:ext cx="3652062" cy="124650"/>
+          </a:xfrm>
+        </p:spPr>
+        <p:txBody>
+          <a:bodyPr lIns="90000"/>
+          <a:lstStyle>
+            <a:lvl1pPr marL="184436" indent="-184436">
+              <a:spcBef>
+                <a:spcPts val="0"/>
+              </a:spcBef>
+              <a:buNone/>
+              <a:defRPr sz="900" i="0"/>
+            </a:lvl1pPr>
+            <a:lvl2pPr marL="141780" indent="0">
+              <a:buNone/>
+              <a:defRPr sz="831" i="1"/>
+            </a:lvl2pPr>
+            <a:lvl3pPr marL="436330" indent="-190139">
+              <a:defRPr/>
+            </a:lvl3pPr>
+            <a:lvl4pPr marL="436330" indent="-190139">
+              <a:defRPr/>
+            </a:lvl4pPr>
+            <a:lvl5pPr marL="436330" indent="-190139">
+              <a:defRPr/>
+            </a:lvl5pPr>
+          </a:lstStyle>
+          <a:p>
+            <a:pPr lvl="0"/>
+            <a:r>
+              <a:rPr lang="en-US" dirty="0"/>
+              <a:t>“…Click to edit Master text styles…”</a:t>
+            </a:r>
+          </a:p>
+        </p:txBody>
+      </p:sp>
+      <p:sp>
+        <p:nvSpPr>
+          <p:cNvPr id="13" name="Text Placeholder 9"/>
+          <p:cNvSpPr>
+            <a:spLocks noGrp="1"/>
+          </p:cNvSpPr>
+          <p:nvPr>
+            <p:ph type="body" sz="quarter" idx="14"/>
+          </p:nvPr>
+        </p:nvSpPr>
+        <p:spPr>
+          <a:xfrm>
+            <a:off x="483577" y="2239468"/>
+            <a:ext cx="4088422" cy="166199"/>
+          </a:xfrm>
+        </p:spPr>
+        <p:txBody>
+          <a:bodyPr lIns="0"/>
+          <a:lstStyle>
+            <a:lvl1pPr marL="0" indent="0" algn="l">
+              <a:spcBef>
+                <a:spcPts val="0"/>
+              </a:spcBef>
+              <a:spcAft>
+                <a:spcPts val="0"/>
+              </a:spcAft>
+              <a:buNone/>
+              <a:defRPr b="1">
+                <a:solidFill>
+                  <a:schemeClr val="accent1"/>
+                </a:solidFill>
+              </a:defRPr>
+            </a:lvl1pPr>
+          </a:lstStyle>
+          <a:p>
+            <a:pPr lvl="0"/>
+            <a:r>
+              <a:rPr lang="en-US" dirty="0"/>
+              <a:t>Click to edit Master text styles</a:t>
+            </a:r>
+          </a:p>
+        </p:txBody>
+      </p:sp>
+      <p:sp>
+        <p:nvSpPr>
+          <p:cNvPr id="14" name="Content Placeholder 5"/>
+          <p:cNvSpPr>
+            <a:spLocks noGrp="1"/>
+          </p:cNvSpPr>
+          <p:nvPr>
+            <p:ph sz="quarter" idx="15"/>
+          </p:nvPr>
+        </p:nvSpPr>
+        <p:spPr>
+          <a:xfrm>
+            <a:off x="483577" y="2514868"/>
+            <a:ext cx="4080738" cy="422167"/>
+          </a:xfrm>
+        </p:spPr>
+        <p:txBody>
+          <a:bodyPr rIns="0"/>
+          <a:lstStyle>
+            <a:lvl1pPr marL="184643" indent="-184643">
+              <a:defRPr/>
+            </a:lvl1pPr>
+            <a:lvl2pPr marL="436165" indent="-186928">
+              <a:defRPr/>
+            </a:lvl2pPr>
+            <a:lvl3pPr marL="436330" indent="-190139">
+              <a:defRPr/>
+            </a:lvl3pPr>
+            <a:lvl4pPr marL="436330" indent="-190139">
+              <a:defRPr/>
+            </a:lvl4pPr>
+            <a:lvl5pPr marL="436330" indent="-190139">
+              <a:defRPr/>
+            </a:lvl5pPr>
+          </a:lstStyle>
+          <a:p>
+            <a:pPr lvl="0"/>
+            <a:r>
+              <a:rPr lang="en-US" dirty="0"/>
+              <a:t>Click to edit Master text styles</a:t>
+            </a:r>
+          </a:p>
+          <a:p>
+            <a:pPr lvl="1"/>
+            <a:r>
+              <a:rPr lang="en-US" dirty="0"/>
+              <a:t>Second level</a:t>
+            </a:r>
+          </a:p>
+        </p:txBody>
+      </p:sp>
+      <p:sp>
+        <p:nvSpPr>
+          <p:cNvPr id="16" name="Text Placeholder 9"/>
+          <p:cNvSpPr>
+            <a:spLocks noGrp="1"/>
+          </p:cNvSpPr>
+          <p:nvPr>
+            <p:ph type="body" sz="quarter" idx="17"/>
+          </p:nvPr>
+        </p:nvSpPr>
+        <p:spPr>
+          <a:xfrm>
+            <a:off x="483578" y="3572811"/>
+            <a:ext cx="4088423" cy="166199"/>
+          </a:xfrm>
+        </p:spPr>
+        <p:txBody>
+          <a:bodyPr lIns="0"/>
+          <a:lstStyle>
+            <a:lvl1pPr marL="0" indent="0" algn="l">
+              <a:spcBef>
+                <a:spcPts val="0"/>
+              </a:spcBef>
+              <a:spcAft>
+                <a:spcPts val="0"/>
+              </a:spcAft>
+              <a:buNone/>
+              <a:defRPr b="1">
+                <a:solidFill>
+                  <a:schemeClr val="accent1"/>
+                </a:solidFill>
+              </a:defRPr>
+            </a:lvl1pPr>
+          </a:lstStyle>
+          <a:p>
+            <a:pPr lvl="0"/>
+            <a:r>
+              <a:rPr lang="en-US" dirty="0"/>
+              <a:t>Click to edit Master text styles</a:t>
+            </a:r>
+          </a:p>
+        </p:txBody>
+      </p:sp>
+      <p:sp>
+        <p:nvSpPr>
+          <p:cNvPr id="17" name="Content Placeholder 5"/>
+          <p:cNvSpPr>
+            <a:spLocks noGrp="1"/>
+          </p:cNvSpPr>
+          <p:nvPr>
+            <p:ph sz="quarter" idx="18"/>
+          </p:nvPr>
+        </p:nvSpPr>
+        <p:spPr>
+          <a:xfrm>
+            <a:off x="483578" y="3848211"/>
+            <a:ext cx="4088423" cy="422167"/>
+          </a:xfrm>
+        </p:spPr>
+        <p:txBody>
+          <a:bodyPr rIns="0"/>
+          <a:lstStyle>
+            <a:lvl1pPr marL="184643" indent="-184643">
+              <a:defRPr/>
+            </a:lvl1pPr>
+            <a:lvl2pPr marL="436165" indent="-186928">
+              <a:defRPr/>
+            </a:lvl2pPr>
+            <a:lvl3pPr marL="436330" indent="-190139">
+              <a:defRPr/>
+            </a:lvl3pPr>
+            <a:lvl4pPr marL="436330" indent="-190139">
+              <a:defRPr/>
+            </a:lvl4pPr>
+            <a:lvl5pPr marL="436330" indent="-190139">
+              <a:defRPr/>
+            </a:lvl5pPr>
+          </a:lstStyle>
+          <a:p>
+            <a:pPr lvl="0"/>
+            <a:r>
+              <a:rPr lang="en-US" dirty="0"/>
+              <a:t>Click to edit Master text styles</a:t>
+            </a:r>
+          </a:p>
+          <a:p>
+            <a:pPr lvl="1"/>
+            <a:r>
+              <a:rPr lang="en-US" dirty="0"/>
+              <a:t>Second level</a:t>
+            </a:r>
+          </a:p>
+        </p:txBody>
+      </p:sp>
+      <p:sp>
+        <p:nvSpPr>
+          <p:cNvPr id="20" name="Content Placeholder 5"/>
+          <p:cNvSpPr>
+            <a:spLocks noGrp="1"/>
+          </p:cNvSpPr>
+          <p:nvPr>
+            <p:ph sz="quarter" idx="19" hasCustomPrompt="1"/>
+          </p:nvPr>
+        </p:nvSpPr>
+        <p:spPr>
+          <a:xfrm>
+            <a:off x="5001231" y="2239468"/>
+            <a:ext cx="3652062" cy="124650"/>
+          </a:xfrm>
+        </p:spPr>
+        <p:txBody>
+          <a:bodyPr lIns="90000"/>
+          <a:lstStyle>
+            <a:lvl1pPr marL="184436" indent="-184436">
+              <a:spcBef>
+                <a:spcPts val="0"/>
+              </a:spcBef>
+              <a:buNone/>
+              <a:defRPr sz="900" i="0"/>
+            </a:lvl1pPr>
+            <a:lvl2pPr marL="141780" indent="0">
+              <a:buNone/>
+              <a:defRPr sz="831" i="1"/>
+            </a:lvl2pPr>
+            <a:lvl3pPr marL="436330" indent="-190139">
+              <a:defRPr/>
+            </a:lvl3pPr>
+            <a:lvl4pPr marL="436330" indent="-190139">
+              <a:defRPr/>
+            </a:lvl4pPr>
+            <a:lvl5pPr marL="436330" indent="-190139">
+              <a:defRPr/>
+            </a:lvl5pPr>
+          </a:lstStyle>
+          <a:p>
+            <a:pPr lvl="0"/>
+            <a:r>
+              <a:rPr lang="en-US" dirty="0"/>
+              <a:t>“…Click to edit Master text styles…”</a:t>
+            </a:r>
+          </a:p>
+        </p:txBody>
+      </p:sp>
+      <p:sp>
+        <p:nvSpPr>
+          <p:cNvPr id="21" name="Content Placeholder 5"/>
+          <p:cNvSpPr>
+            <a:spLocks noGrp="1"/>
+          </p:cNvSpPr>
+          <p:nvPr>
+            <p:ph sz="quarter" idx="20" hasCustomPrompt="1"/>
+          </p:nvPr>
+        </p:nvSpPr>
+        <p:spPr>
+          <a:xfrm>
+            <a:off x="5001231" y="3572811"/>
+            <a:ext cx="3652062" cy="124650"/>
+          </a:xfrm>
+        </p:spPr>
+        <p:txBody>
+          <a:bodyPr lIns="90000"/>
+          <a:lstStyle>
+            <a:lvl1pPr marL="184436" indent="-184436">
+              <a:spcBef>
+                <a:spcPts val="0"/>
+              </a:spcBef>
+              <a:buNone/>
+              <a:defRPr sz="900" i="0"/>
+            </a:lvl1pPr>
+            <a:lvl2pPr marL="141780" indent="0">
+              <a:buNone/>
+              <a:defRPr sz="831" i="1"/>
+            </a:lvl2pPr>
+            <a:lvl3pPr marL="436330" indent="-190139">
+              <a:defRPr/>
+            </a:lvl3pPr>
+            <a:lvl4pPr marL="436330" indent="-190139">
+              <a:defRPr/>
+            </a:lvl4pPr>
+            <a:lvl5pPr marL="436330" indent="-190139">
+              <a:defRPr/>
+            </a:lvl5pPr>
+          </a:lstStyle>
+          <a:p>
+            <a:pPr lvl="0"/>
+            <a:r>
+              <a:rPr lang="en-US" dirty="0"/>
+              <a:t>“…Click to edit Master text styles…”</a:t>
+            </a:r>
+          </a:p>
+        </p:txBody>
+      </p:sp>
+    </p:spTree>
+    <p:extLst>
+      <p:ext uri="{BB962C8B-B14F-4D97-AF65-F5344CB8AC3E}">
+        <p14:creationId xmlns:p14="http://schemas.microsoft.com/office/powerpoint/2010/main" val="4114050264"/>
+      </p:ext>
+    </p:extLst>
   </p:cSld>
   <p:clrMapOvr>
     <a:masterClrMapping/>
@@ -2462,6 +3509,1118 @@
 </p:sldMaster>
 </file>
 
+<file path=ppt/slideMasters/slideMaster2.xml><?xml version="1.0" encoding="utf-8"?>
+<p:sldMaster xmlns:a="http://schemas.openxmlformats.org/drawingml/2006/main" xmlns:r="http://schemas.openxmlformats.org/officeDocument/2006/relationships" xmlns:p="http://schemas.openxmlformats.org/presentationml/2006/main">
+  <p:cSld>
+    <p:bg>
+      <p:bgPr>
+        <a:solidFill>
+          <a:schemeClr val="bg1"/>
+        </a:solidFill>
+        <a:effectLst/>
+      </p:bgPr>
+    </p:bg>
+    <p:spTree>
+      <p:nvGrpSpPr>
+        <p:cNvPr id="1" name=""/>
+        <p:cNvGrpSpPr/>
+        <p:nvPr/>
+      </p:nvGrpSpPr>
+      <p:grpSpPr>
+        <a:xfrm>
+          <a:off x="0" y="0"/>
+          <a:ext cx="0" cy="0"/>
+          <a:chOff x="0" y="0"/>
+          <a:chExt cx="0" cy="0"/>
+        </a:xfrm>
+      </p:grpSpPr>
+      <p:sp>
+        <p:nvSpPr>
+          <p:cNvPr id="2" name="Title Placeholder 1"/>
+          <p:cNvSpPr>
+            <a:spLocks noGrp="1"/>
+          </p:cNvSpPr>
+          <p:nvPr>
+            <p:ph type="title"/>
+          </p:nvPr>
+        </p:nvSpPr>
+        <p:spPr>
+          <a:xfrm>
+            <a:off x="484910" y="756397"/>
+            <a:ext cx="8174182" cy="605118"/>
+          </a:xfrm>
+          <a:prstGeom prst="rect">
+            <a:avLst/>
+          </a:prstGeom>
+        </p:spPr>
+        <p:txBody>
+          <a:bodyPr vert="horz" lIns="0" tIns="0" rIns="0" bIns="0" rtlCol="0" anchor="t" anchorCtr="0">
+            <a:noAutofit/>
+          </a:bodyPr>
+          <a:lstStyle/>
+          <a:p>
+            <a:r>
+              <a:rPr lang="en-GB" noProof="0" dirty="0"/>
+              <a:t>Click to edit</a:t>
+            </a:r>
+            <a:br>
+              <a:rPr lang="en-GB" noProof="0" dirty="0"/>
+            </a:br>
+            <a:r>
+              <a:rPr lang="en-GB" noProof="0" dirty="0"/>
+              <a:t>Master title style</a:t>
+            </a:r>
+          </a:p>
+        </p:txBody>
+      </p:sp>
+      <p:sp>
+        <p:nvSpPr>
+          <p:cNvPr id="3" name="Text Placeholder 2"/>
+          <p:cNvSpPr>
+            <a:spLocks noGrp="1"/>
+          </p:cNvSpPr>
+          <p:nvPr>
+            <p:ph type="body" idx="1"/>
+          </p:nvPr>
+        </p:nvSpPr>
+        <p:spPr>
+          <a:xfrm>
+            <a:off x="484909" y="1462369"/>
+            <a:ext cx="8174182" cy="2924735"/>
+          </a:xfrm>
+          <a:prstGeom prst="rect">
+            <a:avLst/>
+          </a:prstGeom>
+        </p:spPr>
+        <p:txBody>
+          <a:bodyPr vert="horz" lIns="0" tIns="0" rIns="0" bIns="0" rtlCol="0">
+            <a:noAutofit/>
+          </a:bodyPr>
+          <a:lstStyle/>
+          <a:p>
+            <a:pPr lvl="0"/>
+            <a:r>
+              <a:rPr lang="en-GB" noProof="0"/>
+              <a:t>Click to edit Master text styles</a:t>
+            </a:r>
+          </a:p>
+          <a:p>
+            <a:pPr lvl="1"/>
+            <a:r>
+              <a:rPr lang="en-GB" noProof="0"/>
+              <a:t>Second level</a:t>
+            </a:r>
+          </a:p>
+          <a:p>
+            <a:pPr lvl="2"/>
+            <a:r>
+              <a:rPr lang="en-GB" noProof="0"/>
+              <a:t>Third level</a:t>
+            </a:r>
+          </a:p>
+          <a:p>
+            <a:pPr lvl="3"/>
+            <a:r>
+              <a:rPr lang="en-GB" noProof="0"/>
+              <a:t>Fourth level</a:t>
+            </a:r>
+          </a:p>
+          <a:p>
+            <a:pPr lvl="4"/>
+            <a:r>
+              <a:rPr lang="en-GB" noProof="0"/>
+              <a:t>Fifth level</a:t>
+            </a:r>
+            <a:endParaRPr lang="en-GB" noProof="0" dirty="0"/>
+          </a:p>
+        </p:txBody>
+      </p:sp>
+    </p:spTree>
+    <p:extLst>
+      <p:ext uri="{BB962C8B-B14F-4D97-AF65-F5344CB8AC3E}">
+        <p14:creationId xmlns:p14="http://schemas.microsoft.com/office/powerpoint/2010/main" val="2429280439"/>
+      </p:ext>
+    </p:extLst>
+  </p:cSld>
+  <p:clrMap bg1="lt1" tx1="dk1" bg2="lt2" tx2="dk2" accent1="accent1" accent2="accent2" accent3="accent3" accent4="accent4" accent5="accent5" accent6="accent6" hlink="hlink" folHlink="folHlink"/>
+  <p:sldLayoutIdLst>
+    <p:sldLayoutId id="2147483661" r:id="rId1"/>
+  </p:sldLayoutIdLst>
+  <p:hf hdr="0"/>
+  <p:txStyles>
+    <p:titleStyle>
+      <a:lvl1pPr algn="l" defTabSz="692923" rtl="0" eaLnBrk="1" latinLnBrk="0" hangingPunct="1">
+        <a:lnSpc>
+          <a:spcPct val="100000"/>
+        </a:lnSpc>
+        <a:spcBef>
+          <a:spcPct val="0"/>
+        </a:spcBef>
+        <a:buNone/>
+        <a:defRPr sz="1360" b="1" i="1" kern="1200">
+          <a:solidFill>
+            <a:schemeClr val="tx1"/>
+          </a:solidFill>
+          <a:latin typeface="+mj-lt"/>
+          <a:ea typeface="+mj-ea"/>
+          <a:cs typeface="+mj-cs"/>
+        </a:defRPr>
+      </a:lvl1pPr>
+    </p:titleStyle>
+    <p:bodyStyle>
+      <a:lvl1pPr marL="0" marR="0" indent="-155476" algn="l" defTabSz="692923" rtl="0" eaLnBrk="1" fontAlgn="auto" latinLnBrk="0" hangingPunct="1">
+        <a:lnSpc>
+          <a:spcPct val="100000"/>
+        </a:lnSpc>
+        <a:spcBef>
+          <a:spcPts val="0"/>
+        </a:spcBef>
+        <a:spcAft>
+          <a:spcPts val="407"/>
+        </a:spcAft>
+        <a:buClr>
+          <a:schemeClr val="tx1"/>
+        </a:buClr>
+        <a:buSzTx/>
+        <a:buFontTx/>
+        <a:buNone/>
+        <a:tabLst/>
+        <a:defRPr sz="748" kern="1200">
+          <a:solidFill>
+            <a:schemeClr val="tx1"/>
+          </a:solidFill>
+          <a:latin typeface="Georgia" pitchFamily="18" charset="0"/>
+          <a:ea typeface="+mn-ea"/>
+          <a:cs typeface="+mn-cs"/>
+        </a:defRPr>
+      </a:lvl1pPr>
+      <a:lvl2pPr marL="155476" indent="-155476" algn="l" defTabSz="692923" rtl="0" eaLnBrk="1" latinLnBrk="0" hangingPunct="1">
+        <a:lnSpc>
+          <a:spcPct val="100000"/>
+        </a:lnSpc>
+        <a:spcBef>
+          <a:spcPts val="0"/>
+        </a:spcBef>
+        <a:spcAft>
+          <a:spcPts val="407"/>
+        </a:spcAft>
+        <a:buClr>
+          <a:schemeClr val="tx1"/>
+        </a:buClr>
+        <a:buFont typeface="Georgia" pitchFamily="18" charset="0"/>
+        <a:buChar char="•"/>
+        <a:defRPr sz="748" kern="1200">
+          <a:solidFill>
+            <a:schemeClr val="tx1"/>
+          </a:solidFill>
+          <a:latin typeface="Georgia" pitchFamily="18" charset="0"/>
+          <a:ea typeface="+mn-ea"/>
+          <a:cs typeface="+mn-cs"/>
+        </a:defRPr>
+      </a:lvl2pPr>
+      <a:lvl3pPr marL="310951" indent="-155476" algn="l" defTabSz="692923" rtl="0" eaLnBrk="1" latinLnBrk="0" hangingPunct="1">
+        <a:lnSpc>
+          <a:spcPct val="100000"/>
+        </a:lnSpc>
+        <a:spcBef>
+          <a:spcPts val="0"/>
+        </a:spcBef>
+        <a:spcAft>
+          <a:spcPts val="407"/>
+        </a:spcAft>
+        <a:buClr>
+          <a:schemeClr val="tx1"/>
+        </a:buClr>
+        <a:buFont typeface="Georgia" pitchFamily="18" charset="0"/>
+        <a:buChar char="-"/>
+        <a:defRPr sz="748" kern="1200">
+          <a:solidFill>
+            <a:schemeClr val="tx1"/>
+          </a:solidFill>
+          <a:latin typeface="Georgia" pitchFamily="18" charset="0"/>
+          <a:ea typeface="+mn-ea"/>
+          <a:cs typeface="+mn-cs"/>
+        </a:defRPr>
+      </a:lvl3pPr>
+      <a:lvl4pPr marL="466427" indent="-155476" algn="l" defTabSz="692923" rtl="0" eaLnBrk="1" latinLnBrk="0" hangingPunct="1">
+        <a:lnSpc>
+          <a:spcPct val="100000"/>
+        </a:lnSpc>
+        <a:spcBef>
+          <a:spcPts val="0"/>
+        </a:spcBef>
+        <a:spcAft>
+          <a:spcPts val="407"/>
+        </a:spcAft>
+        <a:buClr>
+          <a:schemeClr val="tx1"/>
+        </a:buClr>
+        <a:buFont typeface="Georgia" pitchFamily="18" charset="0"/>
+        <a:buChar char="◦"/>
+        <a:defRPr sz="748" kern="1200">
+          <a:solidFill>
+            <a:schemeClr val="tx1"/>
+          </a:solidFill>
+          <a:latin typeface="Georgia" pitchFamily="18" charset="0"/>
+          <a:ea typeface="+mn-ea"/>
+          <a:cs typeface="+mn-cs"/>
+        </a:defRPr>
+      </a:lvl4pPr>
+      <a:lvl5pPr marL="621903" indent="-155476" algn="l" defTabSz="692923" rtl="0" eaLnBrk="1" latinLnBrk="0" hangingPunct="1">
+        <a:lnSpc>
+          <a:spcPct val="100000"/>
+        </a:lnSpc>
+        <a:spcBef>
+          <a:spcPts val="0"/>
+        </a:spcBef>
+        <a:spcAft>
+          <a:spcPts val="407"/>
+        </a:spcAft>
+        <a:buClr>
+          <a:schemeClr val="tx1"/>
+        </a:buClr>
+        <a:buFont typeface="Georgia" pitchFamily="18" charset="0"/>
+        <a:buChar char="›"/>
+        <a:defRPr sz="748" kern="1200" baseline="0">
+          <a:solidFill>
+            <a:schemeClr val="tx1"/>
+          </a:solidFill>
+          <a:latin typeface="Georgia" pitchFamily="18" charset="0"/>
+          <a:ea typeface="+mn-ea"/>
+          <a:cs typeface="+mn-cs"/>
+        </a:defRPr>
+      </a:lvl5pPr>
+      <a:lvl6pPr marL="155476" marR="0" indent="-155476" algn="l" defTabSz="692923" rtl="0" eaLnBrk="1" fontAlgn="auto" latinLnBrk="0" hangingPunct="1">
+        <a:lnSpc>
+          <a:spcPct val="100000"/>
+        </a:lnSpc>
+        <a:spcBef>
+          <a:spcPts val="0"/>
+        </a:spcBef>
+        <a:spcAft>
+          <a:spcPts val="407"/>
+        </a:spcAft>
+        <a:buClr>
+          <a:schemeClr val="tx1"/>
+        </a:buClr>
+        <a:buSzPct val="100000"/>
+        <a:buFont typeface="+mj-lt"/>
+        <a:buAutoNum type="arabicPeriod"/>
+        <a:tabLst/>
+        <a:defRPr sz="748" kern="1200" baseline="0">
+          <a:solidFill>
+            <a:schemeClr val="tx1"/>
+          </a:solidFill>
+          <a:latin typeface="Georgia" pitchFamily="18" charset="0"/>
+          <a:ea typeface="+mn-ea"/>
+          <a:cs typeface="+mn-cs"/>
+        </a:defRPr>
+      </a:lvl6pPr>
+      <a:lvl7pPr marL="310951" indent="-155476" algn="l" defTabSz="692923" rtl="0" eaLnBrk="1" latinLnBrk="0" hangingPunct="1">
+        <a:lnSpc>
+          <a:spcPct val="100000"/>
+        </a:lnSpc>
+        <a:spcBef>
+          <a:spcPts val="0"/>
+        </a:spcBef>
+        <a:spcAft>
+          <a:spcPts val="407"/>
+        </a:spcAft>
+        <a:buSzPct val="100000"/>
+        <a:buFont typeface="+mj-lt"/>
+        <a:buAutoNum type="alphaLcPeriod"/>
+        <a:defRPr sz="748" kern="1200" baseline="0">
+          <a:solidFill>
+            <a:schemeClr val="tx1"/>
+          </a:solidFill>
+          <a:latin typeface="Georgia" pitchFamily="18" charset="0"/>
+          <a:ea typeface="+mn-ea"/>
+          <a:cs typeface="+mn-cs"/>
+        </a:defRPr>
+      </a:lvl7pPr>
+      <a:lvl8pPr marL="466427" indent="-155476" algn="l" defTabSz="692923" rtl="0" eaLnBrk="1" latinLnBrk="0" hangingPunct="1">
+        <a:lnSpc>
+          <a:spcPct val="100000"/>
+        </a:lnSpc>
+        <a:spcBef>
+          <a:spcPts val="0"/>
+        </a:spcBef>
+        <a:spcAft>
+          <a:spcPts val="407"/>
+        </a:spcAft>
+        <a:buSzPct val="100000"/>
+        <a:buFont typeface="+mj-lt"/>
+        <a:buAutoNum type="romanLcPeriod"/>
+        <a:defRPr sz="748" kern="1200" baseline="0">
+          <a:solidFill>
+            <a:schemeClr val="tx1"/>
+          </a:solidFill>
+          <a:latin typeface="Georgia" pitchFamily="18" charset="0"/>
+          <a:ea typeface="+mn-ea"/>
+          <a:cs typeface="+mn-cs"/>
+        </a:defRPr>
+      </a:lvl8pPr>
+      <a:lvl9pPr marL="0" indent="-155476" algn="l" defTabSz="692923" rtl="0" eaLnBrk="1" latinLnBrk="0" hangingPunct="1">
+        <a:lnSpc>
+          <a:spcPct val="100000"/>
+        </a:lnSpc>
+        <a:spcBef>
+          <a:spcPts val="0"/>
+        </a:spcBef>
+        <a:spcAft>
+          <a:spcPts val="407"/>
+        </a:spcAft>
+        <a:buFont typeface="Arial" pitchFamily="34" charset="0"/>
+        <a:buNone/>
+        <a:defRPr sz="748" b="1" kern="1200" baseline="0">
+          <a:solidFill>
+            <a:schemeClr val="tx2"/>
+          </a:solidFill>
+          <a:latin typeface="Georgia" pitchFamily="18" charset="0"/>
+          <a:ea typeface="+mn-ea"/>
+          <a:cs typeface="+mn-cs"/>
+        </a:defRPr>
+      </a:lvl9pPr>
+    </p:bodyStyle>
+    <p:otherStyle>
+      <a:defPPr>
+        <a:defRPr lang="en-US"/>
+      </a:defPPr>
+      <a:lvl1pPr marL="0" algn="l" defTabSz="692923" rtl="0" eaLnBrk="1" latinLnBrk="0" hangingPunct="1">
+        <a:defRPr sz="1360" kern="1200">
+          <a:solidFill>
+            <a:schemeClr val="tx1"/>
+          </a:solidFill>
+          <a:latin typeface="+mn-lt"/>
+          <a:ea typeface="+mn-ea"/>
+          <a:cs typeface="+mn-cs"/>
+        </a:defRPr>
+      </a:lvl1pPr>
+      <a:lvl2pPr marL="346461" algn="l" defTabSz="692923" rtl="0" eaLnBrk="1" latinLnBrk="0" hangingPunct="1">
+        <a:defRPr sz="1360" kern="1200">
+          <a:solidFill>
+            <a:schemeClr val="tx1"/>
+          </a:solidFill>
+          <a:latin typeface="+mn-lt"/>
+          <a:ea typeface="+mn-ea"/>
+          <a:cs typeface="+mn-cs"/>
+        </a:defRPr>
+      </a:lvl2pPr>
+      <a:lvl3pPr marL="692923" algn="l" defTabSz="692923" rtl="0" eaLnBrk="1" latinLnBrk="0" hangingPunct="1">
+        <a:defRPr sz="1360" kern="1200">
+          <a:solidFill>
+            <a:schemeClr val="tx1"/>
+          </a:solidFill>
+          <a:latin typeface="+mn-lt"/>
+          <a:ea typeface="+mn-ea"/>
+          <a:cs typeface="+mn-cs"/>
+        </a:defRPr>
+      </a:lvl3pPr>
+      <a:lvl4pPr marL="1039385" algn="l" defTabSz="692923" rtl="0" eaLnBrk="1" latinLnBrk="0" hangingPunct="1">
+        <a:defRPr sz="1360" kern="1200">
+          <a:solidFill>
+            <a:schemeClr val="tx1"/>
+          </a:solidFill>
+          <a:latin typeface="+mn-lt"/>
+          <a:ea typeface="+mn-ea"/>
+          <a:cs typeface="+mn-cs"/>
+        </a:defRPr>
+      </a:lvl4pPr>
+      <a:lvl5pPr marL="1385847" algn="l" defTabSz="692923" rtl="0" eaLnBrk="1" latinLnBrk="0" hangingPunct="1">
+        <a:defRPr sz="1360" kern="1200">
+          <a:solidFill>
+            <a:schemeClr val="tx1"/>
+          </a:solidFill>
+          <a:latin typeface="+mn-lt"/>
+          <a:ea typeface="+mn-ea"/>
+          <a:cs typeface="+mn-cs"/>
+        </a:defRPr>
+      </a:lvl5pPr>
+      <a:lvl6pPr marL="1732309" algn="l" defTabSz="692923" rtl="0" eaLnBrk="1" latinLnBrk="0" hangingPunct="1">
+        <a:defRPr sz="1360" kern="1200">
+          <a:solidFill>
+            <a:schemeClr val="tx1"/>
+          </a:solidFill>
+          <a:latin typeface="+mn-lt"/>
+          <a:ea typeface="+mn-ea"/>
+          <a:cs typeface="+mn-cs"/>
+        </a:defRPr>
+      </a:lvl6pPr>
+      <a:lvl7pPr marL="2078770" algn="l" defTabSz="692923" rtl="0" eaLnBrk="1" latinLnBrk="0" hangingPunct="1">
+        <a:defRPr sz="1360" kern="1200">
+          <a:solidFill>
+            <a:schemeClr val="tx1"/>
+          </a:solidFill>
+          <a:latin typeface="+mn-lt"/>
+          <a:ea typeface="+mn-ea"/>
+          <a:cs typeface="+mn-cs"/>
+        </a:defRPr>
+      </a:lvl7pPr>
+      <a:lvl8pPr marL="2425232" algn="l" defTabSz="692923" rtl="0" eaLnBrk="1" latinLnBrk="0" hangingPunct="1">
+        <a:defRPr sz="1360" kern="1200">
+          <a:solidFill>
+            <a:schemeClr val="tx1"/>
+          </a:solidFill>
+          <a:latin typeface="+mn-lt"/>
+          <a:ea typeface="+mn-ea"/>
+          <a:cs typeface="+mn-cs"/>
+        </a:defRPr>
+      </a:lvl8pPr>
+      <a:lvl9pPr marL="2771693" algn="l" defTabSz="692923" rtl="0" eaLnBrk="1" latinLnBrk="0" hangingPunct="1">
+        <a:defRPr sz="1360" kern="1200">
+          <a:solidFill>
+            <a:schemeClr val="tx1"/>
+          </a:solidFill>
+          <a:latin typeface="+mn-lt"/>
+          <a:ea typeface="+mn-ea"/>
+          <a:cs typeface="+mn-cs"/>
+        </a:defRPr>
+      </a:lvl9pPr>
+    </p:otherStyle>
+  </p:txStyles>
+</p:sldMaster>
+</file>
+
+<file path=ppt/slideMasters/slideMaster3.xml><?xml version="1.0" encoding="utf-8"?>
+<p:sldMaster xmlns:a="http://schemas.openxmlformats.org/drawingml/2006/main" xmlns:r="http://schemas.openxmlformats.org/officeDocument/2006/relationships" xmlns:p="http://schemas.openxmlformats.org/presentationml/2006/main" preserve="1">
+  <p:cSld>
+    <p:bg>
+      <p:bgPr>
+        <a:solidFill>
+          <a:schemeClr val="bg1"/>
+        </a:solidFill>
+        <a:effectLst/>
+      </p:bgPr>
+    </p:bg>
+    <p:spTree>
+      <p:nvGrpSpPr>
+        <p:cNvPr id="1" name=""/>
+        <p:cNvGrpSpPr/>
+        <p:nvPr/>
+      </p:nvGrpSpPr>
+      <p:grpSpPr>
+        <a:xfrm>
+          <a:off x="0" y="0"/>
+          <a:ext cx="0" cy="0"/>
+          <a:chOff x="0" y="0"/>
+          <a:chExt cx="0" cy="0"/>
+        </a:xfrm>
+      </p:grpSpPr>
+      <p:graphicFrame>
+        <p:nvGraphicFramePr>
+          <p:cNvPr id="10" name="Object 9" hidden="1">
+            <a:extLst>
+              <a:ext uri="{FF2B5EF4-FFF2-40B4-BE49-F238E27FC236}">
+                <a16:creationId xmlns:a16="http://schemas.microsoft.com/office/drawing/2014/main" id="{7776D4B2-4D7D-45DA-904C-9BD34D896985}"/>
+              </a:ext>
+            </a:extLst>
+          </p:cNvPr>
+          <p:cNvGraphicFramePr>
+            <a:graphicFrameLocks noChangeAspect="1"/>
+          </p:cNvGraphicFramePr>
+          <p:nvPr userDrawn="1">
+            <p:custDataLst>
+              <p:tags r:id="rId4"/>
+            </p:custDataLst>
+            <p:extLst>
+              <p:ext uri="{D42A27DB-BD31-4B8C-83A1-F6EECF244321}">
+                <p14:modId xmlns:p14="http://schemas.microsoft.com/office/powerpoint/2010/main" val="2981466588"/>
+              </p:ext>
+            </p:extLst>
+          </p:nvPr>
+        </p:nvGraphicFramePr>
+        <p:xfrm>
+          <a:off x="1588" y="1191"/>
+          <a:ext cx="1588" cy="1191"/>
+        </p:xfrm>
+        <a:graphic>
+          <a:graphicData uri="http://schemas.openxmlformats.org/presentationml/2006/ole">
+            <mc:AlternateContent xmlns:mc="http://schemas.openxmlformats.org/markup-compatibility/2006">
+              <mc:Choice xmlns:v="urn:schemas-microsoft-com:vml" Requires="v">
+                <p:oleObj spid="_x0000_s1027" name="think-cell Slide" r:id="rId6" imgW="395" imgH="396" progId="TCLayout.ActiveDocument.1">
+                  <p:embed/>
+                </p:oleObj>
+              </mc:Choice>
+              <mc:Fallback>
+                <p:oleObj name="think-cell Slide" r:id="rId6" imgW="395" imgH="396" progId="TCLayout.ActiveDocument.1">
+                  <p:embed/>
+                  <p:pic>
+                    <p:nvPicPr>
+                      <p:cNvPr id="10" name="Object 9" hidden="1">
+                        <a:extLst>
+                          <a:ext uri="{FF2B5EF4-FFF2-40B4-BE49-F238E27FC236}">
+                            <a16:creationId xmlns:a16="http://schemas.microsoft.com/office/drawing/2014/main" id="{7776D4B2-4D7D-45DA-904C-9BD34D896985}"/>
+                          </a:ext>
+                        </a:extLst>
+                      </p:cNvPr>
+                      <p:cNvPicPr/>
+                      <p:nvPr/>
+                    </p:nvPicPr>
+                    <p:blipFill>
+                      <a:blip r:embed="rId7"/>
+                      <a:stretch>
+                        <a:fillRect/>
+                      </a:stretch>
+                    </p:blipFill>
+                    <p:spPr>
+                      <a:xfrm>
+                        <a:off x="1588" y="1191"/>
+                        <a:ext cx="1588" cy="1191"/>
+                      </a:xfrm>
+                      <a:prstGeom prst="rect">
+                        <a:avLst/>
+                      </a:prstGeom>
+                    </p:spPr>
+                  </p:pic>
+                </p:oleObj>
+              </mc:Fallback>
+            </mc:AlternateContent>
+          </a:graphicData>
+        </a:graphic>
+      </p:graphicFrame>
+      <p:sp>
+        <p:nvSpPr>
+          <p:cNvPr id="6" name="Rectangle 5" hidden="1">
+            <a:extLst>
+              <a:ext uri="{FF2B5EF4-FFF2-40B4-BE49-F238E27FC236}">
+                <a16:creationId xmlns:a16="http://schemas.microsoft.com/office/drawing/2014/main" id="{930C38C2-E269-4B31-ADCA-8BB5CD243D41}"/>
+              </a:ext>
+            </a:extLst>
+          </p:cNvPr>
+          <p:cNvSpPr/>
+          <p:nvPr userDrawn="1">
+            <p:custDataLst>
+              <p:tags r:id="rId5"/>
+            </p:custDataLst>
+          </p:nvPr>
+        </p:nvSpPr>
+        <p:spPr>
+          <a:xfrm>
+            <a:off x="0" y="0"/>
+            <a:ext cx="158750" cy="119063"/>
+          </a:xfrm>
+          <a:prstGeom prst="rect">
+            <a:avLst/>
+          </a:prstGeom>
+          <a:solidFill>
+            <a:schemeClr val="accent3"/>
+          </a:solidFill>
+          <a:ln w="6350" cap="flat">
+            <a:noFill/>
+            <a:miter lim="800000"/>
+          </a:ln>
+        </p:spPr>
+        <p:style>
+          <a:lnRef idx="2">
+            <a:schemeClr val="accent1">
+              <a:shade val="50000"/>
+            </a:schemeClr>
+          </a:lnRef>
+          <a:fillRef idx="1">
+            <a:schemeClr val="accent1"/>
+          </a:fillRef>
+          <a:effectRef idx="0">
+            <a:schemeClr val="accent1"/>
+          </a:effectRef>
+          <a:fontRef idx="minor">
+            <a:schemeClr val="lt1"/>
+          </a:fontRef>
+        </p:style>
+        <p:txBody>
+          <a:bodyPr rot="0" spcFirstLastPara="0" vertOverflow="overflow" horzOverflow="overflow" vert="horz" wrap="none" lIns="0" tIns="0" rIns="0" bIns="0" numCol="1" spcCol="0" rtlCol="0" fromWordArt="0" anchor="ctr" anchorCtr="0" forceAA="0" compatLnSpc="1">
+            <a:prstTxWarp prst="textNoShape">
+              <a:avLst/>
+            </a:prstTxWarp>
+            <a:noAutofit/>
+          </a:bodyPr>
+          <a:lstStyle/>
+          <a:p>
+            <a:pPr marL="0" lvl="0" indent="0" algn="ctr" eaLnBrk="1">
+              <a:lnSpc>
+                <a:spcPct val="90000"/>
+              </a:lnSpc>
+              <a:spcBef>
+                <a:spcPct val="0"/>
+              </a:spcBef>
+              <a:spcAft>
+                <a:spcPct val="0"/>
+              </a:spcAft>
+            </a:pPr>
+            <a:endParaRPr lang="en-US" sz="1800" b="1" i="0" baseline="0" dirty="0" err="1">
+              <a:solidFill>
+                <a:schemeClr val="bg1"/>
+              </a:solidFill>
+              <a:latin typeface="Arial" pitchFamily="34" charset="0"/>
+              <a:ea typeface="+mj-ea"/>
+              <a:cs typeface="Arial" pitchFamily="34" charset="0"/>
+              <a:sym typeface="Arial" panose="020B0604020202020204" pitchFamily="34" charset="0"/>
+            </a:endParaRPr>
+          </a:p>
+        </p:txBody>
+      </p:sp>
+      <p:sp>
+        <p:nvSpPr>
+          <p:cNvPr id="2" name="Title"/>
+          <p:cNvSpPr>
+            <a:spLocks noGrp="1"/>
+          </p:cNvSpPr>
+          <p:nvPr>
+            <p:ph type="title"/>
+          </p:nvPr>
+        </p:nvSpPr>
+        <p:spPr>
+          <a:xfrm>
+            <a:off x="244507" y="603504"/>
+            <a:ext cx="8641080" cy="253746"/>
+          </a:xfrm>
+          <a:prstGeom prst="rect">
+            <a:avLst/>
+          </a:prstGeom>
+          <a:noFill/>
+          <a:ln w="6350">
+            <a:noFill/>
+            <a:miter lim="800000"/>
+          </a:ln>
+        </p:spPr>
+        <p:txBody>
+          <a:bodyPr vert="horz" wrap="square" lIns="0" tIns="0" rIns="0" bIns="0" rtlCol="0" anchor="t" anchorCtr="0">
+            <a:spAutoFit/>
+          </a:bodyPr>
+          <a:lstStyle/>
+          <a:p>
+            <a:r>
+              <a:rPr lang="en-US" dirty="0"/>
+              <a:t>Title</a:t>
+            </a:r>
+          </a:p>
+        </p:txBody>
+      </p:sp>
+      <p:sp>
+        <p:nvSpPr>
+          <p:cNvPr id="3" name="Text Placeholder 1"/>
+          <p:cNvSpPr>
+            <a:spLocks noGrp="1"/>
+          </p:cNvSpPr>
+          <p:nvPr>
+            <p:ph type="body" idx="1"/>
+          </p:nvPr>
+        </p:nvSpPr>
+        <p:spPr>
+          <a:xfrm>
+            <a:off x="244507" y="1543050"/>
+            <a:ext cx="8641080" cy="1023357"/>
+          </a:xfrm>
+          <a:prstGeom prst="rect">
+            <a:avLst/>
+          </a:prstGeom>
+          <a:noFill/>
+          <a:ln w="6350">
+            <a:noFill/>
+            <a:miter lim="800000"/>
+          </a:ln>
+        </p:spPr>
+        <p:txBody>
+          <a:bodyPr vert="horz" lIns="0" tIns="0" rIns="0" bIns="0" rtlCol="0">
+            <a:spAutoFit/>
+          </a:bodyPr>
+          <a:lstStyle/>
+          <a:p>
+            <a:pPr lvl="0"/>
+            <a:r>
+              <a:rPr lang="en-US" dirty="0"/>
+              <a:t>Text on first level here</a:t>
+            </a:r>
+          </a:p>
+          <a:p>
+            <a:pPr lvl="1"/>
+            <a:r>
+              <a:rPr lang="en-US" dirty="0"/>
+              <a:t>Second level</a:t>
+            </a:r>
+          </a:p>
+          <a:p>
+            <a:pPr lvl="2"/>
+            <a:r>
+              <a:rPr lang="en-US" dirty="0"/>
+              <a:t>Third level</a:t>
+            </a:r>
+          </a:p>
+          <a:p>
+            <a:pPr lvl="3"/>
+            <a:r>
+              <a:rPr lang="en-US" dirty="0"/>
+              <a:t>Fourth level</a:t>
+            </a:r>
+          </a:p>
+          <a:p>
+            <a:pPr lvl="4"/>
+            <a:r>
+              <a:rPr lang="en-US" dirty="0"/>
+              <a:t>Fifth level</a:t>
+            </a:r>
+          </a:p>
+        </p:txBody>
+      </p:sp>
+    </p:spTree>
+    <p:extLst>
+      <p:ext uri="{BB962C8B-B14F-4D97-AF65-F5344CB8AC3E}">
+        <p14:creationId xmlns:p14="http://schemas.microsoft.com/office/powerpoint/2010/main" val="3702096967"/>
+      </p:ext>
+    </p:extLst>
+  </p:cSld>
+  <p:clrMap bg1="lt1" tx1="dk1" bg2="lt2" tx2="dk2" accent1="accent1" accent2="accent2" accent3="accent3" accent4="accent4" accent5="accent5" accent6="accent6" hlink="hlink" folHlink="folHlink"/>
+  <p:sldLayoutIdLst>
+    <p:sldLayoutId id="2147483663" r:id="rId1"/>
+  </p:sldLayoutIdLst>
+  <p:hf sldNum="0" hdr="0" ftr="0" dt="0"/>
+  <p:txStyles>
+    <p:titleStyle>
+      <a:lvl1pPr marL="0" indent="0" algn="l" defTabSz="685800" rtl="0" eaLnBrk="1" latinLnBrk="0" hangingPunct="1">
+        <a:lnSpc>
+          <a:spcPct val="90000"/>
+        </a:lnSpc>
+        <a:spcBef>
+          <a:spcPct val="0"/>
+        </a:spcBef>
+        <a:buNone/>
+        <a:defRPr sz="1800" b="1" kern="1200" baseline="0">
+          <a:solidFill>
+            <a:srgbClr val="00B050"/>
+          </a:solidFill>
+          <a:latin typeface="Arial" pitchFamily="34" charset="0"/>
+          <a:ea typeface="+mj-ea"/>
+          <a:cs typeface="Arial" pitchFamily="34" charset="0"/>
+        </a:defRPr>
+      </a:lvl1pPr>
+    </p:titleStyle>
+    <p:bodyStyle>
+      <a:lvl1pPr marL="0" indent="0" algn="l" defTabSz="685800" rtl="0" eaLnBrk="1" latinLnBrk="0" hangingPunct="1">
+        <a:lnSpc>
+          <a:spcPct val="90000"/>
+        </a:lnSpc>
+        <a:spcBef>
+          <a:spcPts val="1050"/>
+        </a:spcBef>
+        <a:buClr>
+          <a:srgbClr val="FF6C45"/>
+        </a:buClr>
+        <a:buSzPct val="100000"/>
+        <a:buFontTx/>
+        <a:buNone/>
+        <a:defRPr sz="1200" kern="1200">
+          <a:solidFill>
+            <a:srgbClr val="00B050"/>
+          </a:solidFill>
+          <a:latin typeface="Arial" pitchFamily="34" charset="0"/>
+          <a:ea typeface="+mn-ea"/>
+          <a:cs typeface="Arial" pitchFamily="34" charset="0"/>
+        </a:defRPr>
+      </a:lvl1pPr>
+      <a:lvl2pPr marL="137160" indent="0" algn="l" defTabSz="685800" rtl="0" eaLnBrk="1" latinLnBrk="0" hangingPunct="1">
+        <a:lnSpc>
+          <a:spcPct val="90000"/>
+        </a:lnSpc>
+        <a:spcBef>
+          <a:spcPts val="675"/>
+        </a:spcBef>
+        <a:buClr>
+          <a:srgbClr val="FF6C45"/>
+        </a:buClr>
+        <a:buFontTx/>
+        <a:buNone/>
+        <a:defRPr sz="1200" kern="1200">
+          <a:solidFill>
+            <a:srgbClr val="00B050"/>
+          </a:solidFill>
+          <a:latin typeface="Arial" pitchFamily="34" charset="0"/>
+          <a:ea typeface="+mn-ea"/>
+          <a:cs typeface="Arial" pitchFamily="34" charset="0"/>
+        </a:defRPr>
+      </a:lvl2pPr>
+      <a:lvl3pPr marL="232200" indent="0" algn="l" defTabSz="685800" rtl="0" eaLnBrk="1" latinLnBrk="0" hangingPunct="1">
+        <a:lnSpc>
+          <a:spcPct val="90000"/>
+        </a:lnSpc>
+        <a:spcBef>
+          <a:spcPts val="450"/>
+        </a:spcBef>
+        <a:buClr>
+          <a:srgbClr val="FF6C45"/>
+        </a:buClr>
+        <a:buFontTx/>
+        <a:buNone/>
+        <a:defRPr sz="1200" kern="1200">
+          <a:solidFill>
+            <a:srgbClr val="00B050"/>
+          </a:solidFill>
+          <a:latin typeface="Arial" pitchFamily="34" charset="0"/>
+          <a:ea typeface="+mn-ea"/>
+          <a:cs typeface="Arial" pitchFamily="34" charset="0"/>
+        </a:defRPr>
+      </a:lvl3pPr>
+      <a:lvl4pPr marL="372330" indent="0" algn="l" defTabSz="685800" rtl="0" eaLnBrk="1" latinLnBrk="0" hangingPunct="1">
+        <a:lnSpc>
+          <a:spcPct val="90000"/>
+        </a:lnSpc>
+        <a:spcBef>
+          <a:spcPts val="150"/>
+        </a:spcBef>
+        <a:buClr>
+          <a:srgbClr val="FF6C45"/>
+        </a:buClr>
+        <a:buFontTx/>
+        <a:buNone/>
+        <a:defRPr sz="1200" kern="1200">
+          <a:solidFill>
+            <a:srgbClr val="00B050"/>
+          </a:solidFill>
+          <a:latin typeface="Arial" pitchFamily="34" charset="0"/>
+          <a:ea typeface="+mn-ea"/>
+          <a:cs typeface="Arial" pitchFamily="34" charset="0"/>
+        </a:defRPr>
+      </a:lvl4pPr>
+      <a:lvl5pPr marL="475200" indent="0" algn="l" defTabSz="685800" rtl="0" eaLnBrk="1" latinLnBrk="0" hangingPunct="1">
+        <a:lnSpc>
+          <a:spcPct val="90000"/>
+        </a:lnSpc>
+        <a:spcBef>
+          <a:spcPts val="75"/>
+        </a:spcBef>
+        <a:buClr>
+          <a:srgbClr val="FF6C45"/>
+        </a:buClr>
+        <a:buFontTx/>
+        <a:buNone/>
+        <a:defRPr sz="1200" kern="1200">
+          <a:solidFill>
+            <a:srgbClr val="00B050"/>
+          </a:solidFill>
+          <a:latin typeface="Arial" pitchFamily="34" charset="0"/>
+          <a:ea typeface="+mn-ea"/>
+          <a:cs typeface="Arial" pitchFamily="34" charset="0"/>
+        </a:defRPr>
+      </a:lvl5pPr>
+      <a:lvl6pPr marL="1885950" indent="-171450" algn="l" defTabSz="685800" rtl="0" eaLnBrk="1" latinLnBrk="0" hangingPunct="1">
+        <a:spcBef>
+          <a:spcPct val="20000"/>
+        </a:spcBef>
+        <a:buFont typeface="Arial" pitchFamily="34" charset="0"/>
+        <a:buChar char="•"/>
+        <a:defRPr sz="1500" kern="1200">
+          <a:solidFill>
+            <a:schemeClr val="tx1"/>
+          </a:solidFill>
+          <a:latin typeface="+mn-lt"/>
+          <a:ea typeface="+mn-ea"/>
+          <a:cs typeface="+mn-cs"/>
+        </a:defRPr>
+      </a:lvl6pPr>
+      <a:lvl7pPr marL="2228850" indent="-171450" algn="l" defTabSz="685800" rtl="0" eaLnBrk="1" latinLnBrk="0" hangingPunct="1">
+        <a:spcBef>
+          <a:spcPct val="20000"/>
+        </a:spcBef>
+        <a:buFont typeface="Arial" pitchFamily="34" charset="0"/>
+        <a:buChar char="•"/>
+        <a:defRPr sz="1500" kern="1200">
+          <a:solidFill>
+            <a:schemeClr val="tx1"/>
+          </a:solidFill>
+          <a:latin typeface="+mn-lt"/>
+          <a:ea typeface="+mn-ea"/>
+          <a:cs typeface="+mn-cs"/>
+        </a:defRPr>
+      </a:lvl7pPr>
+      <a:lvl8pPr marL="2571750" indent="-171450" algn="l" defTabSz="685800" rtl="0" eaLnBrk="1" latinLnBrk="0" hangingPunct="1">
+        <a:spcBef>
+          <a:spcPct val="20000"/>
+        </a:spcBef>
+        <a:buFont typeface="Arial" pitchFamily="34" charset="0"/>
+        <a:buChar char="•"/>
+        <a:defRPr sz="1500" kern="1200">
+          <a:solidFill>
+            <a:schemeClr val="tx1"/>
+          </a:solidFill>
+          <a:latin typeface="+mn-lt"/>
+          <a:ea typeface="+mn-ea"/>
+          <a:cs typeface="+mn-cs"/>
+        </a:defRPr>
+      </a:lvl8pPr>
+      <a:lvl9pPr marL="2914650" indent="-171450" algn="l" defTabSz="685800" rtl="0" eaLnBrk="1" latinLnBrk="0" hangingPunct="1">
+        <a:spcBef>
+          <a:spcPct val="20000"/>
+        </a:spcBef>
+        <a:buFont typeface="Arial" pitchFamily="34" charset="0"/>
+        <a:buChar char="•"/>
+        <a:defRPr sz="1500" kern="1200">
+          <a:solidFill>
+            <a:schemeClr val="tx1"/>
+          </a:solidFill>
+          <a:latin typeface="+mn-lt"/>
+          <a:ea typeface="+mn-ea"/>
+          <a:cs typeface="+mn-cs"/>
+        </a:defRPr>
+      </a:lvl9pPr>
+    </p:bodyStyle>
+    <p:otherStyle>
+      <a:defPPr>
+        <a:defRPr lang="en-US"/>
+      </a:defPPr>
+      <a:lvl1pPr marL="0" algn="l" defTabSz="685800" rtl="0" eaLnBrk="1" latinLnBrk="0" hangingPunct="1">
+        <a:defRPr sz="1350" kern="1200">
+          <a:solidFill>
+            <a:schemeClr val="tx1"/>
+          </a:solidFill>
+          <a:latin typeface="+mn-lt"/>
+          <a:ea typeface="+mn-ea"/>
+          <a:cs typeface="+mn-cs"/>
+        </a:defRPr>
+      </a:lvl1pPr>
+      <a:lvl2pPr marL="342900" algn="l" defTabSz="685800" rtl="0" eaLnBrk="1" latinLnBrk="0" hangingPunct="1">
+        <a:defRPr sz="1350" kern="1200">
+          <a:solidFill>
+            <a:schemeClr val="tx1"/>
+          </a:solidFill>
+          <a:latin typeface="+mn-lt"/>
+          <a:ea typeface="+mn-ea"/>
+          <a:cs typeface="+mn-cs"/>
+        </a:defRPr>
+      </a:lvl2pPr>
+      <a:lvl3pPr marL="685800" algn="l" defTabSz="685800" rtl="0" eaLnBrk="1" latinLnBrk="0" hangingPunct="1">
+        <a:defRPr sz="1350" kern="1200">
+          <a:solidFill>
+            <a:schemeClr val="tx1"/>
+          </a:solidFill>
+          <a:latin typeface="+mn-lt"/>
+          <a:ea typeface="+mn-ea"/>
+          <a:cs typeface="+mn-cs"/>
+        </a:defRPr>
+      </a:lvl3pPr>
+      <a:lvl4pPr marL="1028700" algn="l" defTabSz="685800" rtl="0" eaLnBrk="1" latinLnBrk="0" hangingPunct="1">
+        <a:defRPr sz="1350" kern="1200">
+          <a:solidFill>
+            <a:schemeClr val="tx1"/>
+          </a:solidFill>
+          <a:latin typeface="+mn-lt"/>
+          <a:ea typeface="+mn-ea"/>
+          <a:cs typeface="+mn-cs"/>
+        </a:defRPr>
+      </a:lvl4pPr>
+      <a:lvl5pPr marL="1371600" algn="l" defTabSz="685800" rtl="0" eaLnBrk="1" latinLnBrk="0" hangingPunct="1">
+        <a:defRPr sz="1350" kern="1200">
+          <a:solidFill>
+            <a:schemeClr val="tx1"/>
+          </a:solidFill>
+          <a:latin typeface="+mn-lt"/>
+          <a:ea typeface="+mn-ea"/>
+          <a:cs typeface="+mn-cs"/>
+        </a:defRPr>
+      </a:lvl5pPr>
+      <a:lvl6pPr marL="1714500" algn="l" defTabSz="685800" rtl="0" eaLnBrk="1" latinLnBrk="0" hangingPunct="1">
+        <a:defRPr sz="1350" kern="1200">
+          <a:solidFill>
+            <a:schemeClr val="tx1"/>
+          </a:solidFill>
+          <a:latin typeface="+mn-lt"/>
+          <a:ea typeface="+mn-ea"/>
+          <a:cs typeface="+mn-cs"/>
+        </a:defRPr>
+      </a:lvl6pPr>
+      <a:lvl7pPr marL="2057400" algn="l" defTabSz="685800" rtl="0" eaLnBrk="1" latinLnBrk="0" hangingPunct="1">
+        <a:defRPr sz="1350" kern="1200">
+          <a:solidFill>
+            <a:schemeClr val="tx1"/>
+          </a:solidFill>
+          <a:latin typeface="+mn-lt"/>
+          <a:ea typeface="+mn-ea"/>
+          <a:cs typeface="+mn-cs"/>
+        </a:defRPr>
+      </a:lvl7pPr>
+      <a:lvl8pPr marL="2400300" algn="l" defTabSz="685800" rtl="0" eaLnBrk="1" latinLnBrk="0" hangingPunct="1">
+        <a:defRPr sz="1350" kern="1200">
+          <a:solidFill>
+            <a:schemeClr val="tx1"/>
+          </a:solidFill>
+          <a:latin typeface="+mn-lt"/>
+          <a:ea typeface="+mn-ea"/>
+          <a:cs typeface="+mn-cs"/>
+        </a:defRPr>
+      </a:lvl8pPr>
+      <a:lvl9pPr marL="2743200" algn="l" defTabSz="685800" rtl="0" eaLnBrk="1" latinLnBrk="0" hangingPunct="1">
+        <a:defRPr sz="1350" kern="1200">
+          <a:solidFill>
+            <a:schemeClr val="tx1"/>
+          </a:solidFill>
+          <a:latin typeface="+mn-lt"/>
+          <a:ea typeface="+mn-ea"/>
+          <a:cs typeface="+mn-cs"/>
+        </a:defRPr>
+      </a:lvl9pPr>
+    </p:otherStyle>
+  </p:txStyles>
+  <p:extLst>
+    <p:ext uri="{27BBF7A9-308A-43DC-89C8-2F10F3537804}">
+      <p15:sldGuideLst xmlns:p15="http://schemas.microsoft.com/office/powerpoint/2012/main">
+        <p15:guide id="1" orient="horz" pos="1026">
+          <p15:clr>
+            <a:srgbClr val="FF9696"/>
+          </p15:clr>
+        </p15:guide>
+        <p15:guide id="2" orient="horz" pos="1298">
+          <p15:clr>
+            <a:srgbClr val="FF9696"/>
+          </p15:clr>
+        </p15:guide>
+        <p15:guide id="3" orient="horz" pos="1548">
+          <p15:clr>
+            <a:srgbClr val="FF9696"/>
+          </p15:clr>
+        </p15:guide>
+        <p15:guide id="4" orient="horz" pos="3566">
+          <p15:clr>
+            <a:srgbClr val="FF9696"/>
+          </p15:clr>
+        </p15:guide>
+        <p15:guide id="5" orient="horz" pos="3997">
+          <p15:clr>
+            <a:srgbClr val="FF9696"/>
+          </p15:clr>
+        </p15:guide>
+        <p15:guide id="6" orient="horz" pos="4247">
+          <p15:clr>
+            <a:srgbClr val="FF9696"/>
+          </p15:clr>
+        </p15:guide>
+        <p15:guide id="7" pos="158">
+          <p15:clr>
+            <a:srgbClr val="FF9696"/>
+          </p15:clr>
+        </p15:guide>
+        <p15:guide id="8" pos="2652">
+          <p15:clr>
+            <a:srgbClr val="FF9696"/>
+          </p15:clr>
+        </p15:guide>
+        <p15:guide id="9" pos="2881">
+          <p15:clr>
+            <a:srgbClr val="FF9696"/>
+          </p15:clr>
+        </p15:guide>
+        <p15:guide id="10" pos="3107">
+          <p15:clr>
+            <a:srgbClr val="FF9696"/>
+          </p15:clr>
+        </p15:guide>
+        <p15:guide id="11" pos="5602">
+          <p15:clr>
+            <a:srgbClr val="FF9696"/>
+          </p15:clr>
+        </p15:guide>
+      </p15:sldGuideLst>
+    </p:ext>
+  </p:extLst>
+</p:sldMaster>
+</file>
+
 <file path=ppt/slides/slide1.xml><?xml version="1.0" encoding="utf-8"?>
 <p:sld xmlns:a="http://schemas.openxmlformats.org/drawingml/2006/main" xmlns:r="http://schemas.openxmlformats.org/officeDocument/2006/relationships" xmlns:p="http://schemas.openxmlformats.org/presentationml/2006/main">
   <p:cSld>
@@ -2593,6 +4752,413 @@
     <a:masterClrMapping/>
   </p:clrMapOvr>
 </p:sld>
+</file>
+
+<file path=ppt/slides/slide2.xml><?xml version="1.0" encoding="utf-8"?>
+<p:sld xmlns:a="http://schemas.openxmlformats.org/drawingml/2006/main" xmlns:r="http://schemas.openxmlformats.org/officeDocument/2006/relationships" xmlns:p="http://schemas.openxmlformats.org/presentationml/2006/main">
+  <p:cSld>
+    <p:spTree>
+      <p:nvGrpSpPr>
+        <p:cNvPr id="1" name=""/>
+        <p:cNvGrpSpPr/>
+        <p:nvPr/>
+      </p:nvGrpSpPr>
+      <p:grpSpPr>
+        <a:xfrm>
+          <a:off x="0" y="0"/>
+          <a:ext cx="0" cy="0"/>
+          <a:chOff x="0" y="0"/>
+          <a:chExt cx="0" cy="0"/>
+        </a:xfrm>
+      </p:grpSpPr>
+      <p:sp>
+        <p:nvSpPr>
+          <p:cNvPr id="5" name="Subtitle 4"/>
+          <p:cNvSpPr>
+            <a:spLocks noGrp="1"/>
+          </p:cNvSpPr>
+          <p:nvPr>
+            <p:ph type="subTitle" idx="1"/>
+          </p:nvPr>
+        </p:nvSpPr>
+        <p:spPr>
+          <a:xfrm>
+            <a:off x="2422830" y="1102261"/>
+            <a:ext cx="4298341" cy="605118"/>
+          </a:xfrm>
+        </p:spPr>
+        <p:txBody>
+          <a:bodyPr/>
+          <a:lstStyle/>
+          <a:p>
+            <a:r>
+              <a:rPr lang="en-GB">
+                <a:solidFill>
+                  <a:srgbClr val="FF0000"/>
+                </a:solidFill>
+              </a:rPr>
+              <a:t>Test subtitle</a:t>
+            </a:r>
+            <a:endParaRPr lang="en-GB" dirty="0">
+              <a:solidFill>
+                <a:srgbClr val="FF0000"/>
+              </a:solidFill>
+            </a:endParaRPr>
+          </a:p>
+        </p:txBody>
+      </p:sp>
+    </p:spTree>
+  </p:cSld>
+  <p:clrMapOvr>
+    <a:masterClrMapping/>
+  </p:clrMapOvr>
+</p:sld>
+</file>
+
+<file path=ppt/slides/slide3.xml><?xml version="1.0" encoding="utf-8"?>
+<p:sld xmlns:a="http://schemas.openxmlformats.org/drawingml/2006/main" xmlns:r="http://schemas.openxmlformats.org/officeDocument/2006/relationships" xmlns:p="http://schemas.openxmlformats.org/presentationml/2006/main">
+  <p:cSld>
+    <p:spTree>
+      <p:nvGrpSpPr>
+        <p:cNvPr id="1" name=""/>
+        <p:cNvGrpSpPr/>
+        <p:nvPr/>
+      </p:nvGrpSpPr>
+      <p:grpSpPr>
+        <a:xfrm>
+          <a:off x="0" y="0"/>
+          <a:ext cx="0" cy="0"/>
+          <a:chOff x="0" y="0"/>
+          <a:chExt cx="0" cy="0"/>
+        </a:xfrm>
+      </p:grpSpPr>
+      <p:sp>
+        <p:nvSpPr>
+          <p:cNvPr id="3" name="Title 2"/>
+          <p:cNvSpPr>
+            <a:spLocks noGrp="1"/>
+          </p:cNvSpPr>
+          <p:nvPr>
+            <p:ph type="title"/>
+          </p:nvPr>
+        </p:nvSpPr>
+        <p:spPr>
+          <a:xfrm>
+            <a:off x="1326380" y="603505"/>
+            <a:ext cx="6480810" cy="249299"/>
+          </a:xfrm>
+          <a:noFill/>
+          <a:ln w="6350">
+            <a:noFill/>
+            <a:miter lim="800000"/>
+          </a:ln>
+        </p:spPr>
+        <p:txBody>
+          <a:bodyPr vert="horz" wrap="square" lIns="0" tIns="0" rIns="0" bIns="0" rtlCol="0" anchor="t" anchorCtr="0">
+            <a:noAutofit/>
+          </a:bodyPr>
+          <a:lstStyle/>
+          <a:p>
+            <a:r>
+              <a:rPr lang="en-GB" dirty="0">
+                <a:solidFill>
+                  <a:srgbClr val="00B050"/>
+                </a:solidFill>
+                <a:latin typeface="Arial"/>
+              </a:rPr>
+              <a:t>Test</a:t>
+            </a:r>
+          </a:p>
+        </p:txBody>
+      </p:sp>
+      <p:sp>
+        <p:nvSpPr>
+          <p:cNvPr id="5" name="Text Placeholder 4"/>
+          <p:cNvSpPr>
+            <a:spLocks noGrp="1"/>
+          </p:cNvSpPr>
+          <p:nvPr>
+            <p:ph type="body" sz="quarter" idx="12"/>
+          </p:nvPr>
+        </p:nvSpPr>
+        <p:spPr>
+          <a:xfrm>
+            <a:off x="1505683" y="1127986"/>
+            <a:ext cx="3066317" cy="186974"/>
+          </a:xfrm>
+        </p:spPr>
+        <p:txBody>
+          <a:bodyPr/>
+          <a:lstStyle/>
+          <a:p>
+            <a:r>
+              <a:rPr lang="en-GB" sz="1350" dirty="0">
+                <a:solidFill>
+                  <a:srgbClr val="00B050"/>
+                </a:solidFill>
+              </a:rPr>
+              <a:t>test</a:t>
+            </a:r>
+          </a:p>
+        </p:txBody>
+      </p:sp>
+      <p:sp>
+        <p:nvSpPr>
+          <p:cNvPr id="4" name="Content Placeholder 3"/>
+          <p:cNvSpPr>
+            <a:spLocks noGrp="1"/>
+          </p:cNvSpPr>
+          <p:nvPr>
+            <p:ph sz="quarter" idx="10"/>
+          </p:nvPr>
+        </p:nvSpPr>
+        <p:spPr>
+          <a:xfrm>
+            <a:off x="1505683" y="1403387"/>
+            <a:ext cx="3060554" cy="515013"/>
+          </a:xfrm>
+        </p:spPr>
+        <p:txBody>
+          <a:bodyPr/>
+          <a:lstStyle/>
+          <a:p>
+            <a:pPr marL="0" indent="0">
+              <a:buNone/>
+            </a:pPr>
+            <a:r>
+              <a:rPr lang="en-GB" sz="1350" dirty="0">
+                <a:solidFill>
+                  <a:srgbClr val="00B050"/>
+                </a:solidFill>
+              </a:rPr>
+              <a:t>test</a:t>
+            </a:r>
+          </a:p>
+          <a:p>
+            <a:pPr marL="0" indent="0">
+              <a:buNone/>
+            </a:pPr>
+            <a:endParaRPr lang="en-GB" sz="1350" dirty="0"/>
+          </a:p>
+        </p:txBody>
+      </p:sp>
+      <p:sp>
+        <p:nvSpPr>
+          <p:cNvPr id="6" name="Content Placeholder 5"/>
+          <p:cNvSpPr>
+            <a:spLocks noGrp="1"/>
+          </p:cNvSpPr>
+          <p:nvPr>
+            <p:ph sz="quarter" idx="13"/>
+          </p:nvPr>
+        </p:nvSpPr>
+        <p:spPr>
+          <a:xfrm>
+            <a:off x="4893923" y="1131011"/>
+            <a:ext cx="2739047" cy="339067"/>
+          </a:xfrm>
+        </p:spPr>
+        <p:txBody>
+          <a:bodyPr/>
+          <a:lstStyle/>
+          <a:p>
+            <a:pPr marL="0" lvl="1"/>
+            <a:r>
+              <a:rPr lang="en-GB" sz="900" dirty="0">
+                <a:solidFill>
+                  <a:srgbClr val="00B050"/>
+                </a:solidFill>
+              </a:rPr>
+              <a:t>test</a:t>
+            </a:r>
+          </a:p>
+          <a:p>
+            <a:pPr marL="628077" lvl="1" indent="-311546"/>
+            <a:r>
+              <a:rPr lang="en-GB" sz="900" dirty="0">
+                <a:solidFill>
+                  <a:srgbClr val="00B050"/>
+                </a:solidFill>
+              </a:rPr>
+              <a:t>test</a:t>
+            </a:r>
+          </a:p>
+        </p:txBody>
+      </p:sp>
+      <p:sp>
+        <p:nvSpPr>
+          <p:cNvPr id="17" name="Source"/>
+          <p:cNvSpPr txBox="1"/>
+          <p:nvPr/>
+        </p:nvSpPr>
+        <p:spPr>
+          <a:xfrm>
+            <a:off x="1506878" y="4609211"/>
+            <a:ext cx="5285277" cy="120869"/>
+          </a:xfrm>
+          <a:prstGeom prst="rect">
+            <a:avLst/>
+          </a:prstGeom>
+        </p:spPr>
+        <p:txBody>
+          <a:bodyPr vert="horz" wrap="square" lIns="0" tIns="0" rIns="0" bIns="0" rtlCol="0" anchor="b">
+            <a:noAutofit/>
+          </a:bodyPr>
+          <a:lstStyle>
+            <a:defPPr>
+              <a:defRPr lang="en-US"/>
+            </a:defPPr>
+            <a:lvl1pPr marL="0" algn="l" defTabSz="914400" rtl="0" eaLnBrk="1" latinLnBrk="0" hangingPunct="1">
+              <a:defRPr sz="1800" kern="1200">
+                <a:solidFill>
+                  <a:schemeClr val="tx1"/>
+                </a:solidFill>
+                <a:latin typeface="+mn-lt"/>
+                <a:ea typeface="+mn-ea"/>
+                <a:cs typeface="+mn-cs"/>
+              </a:defRPr>
+            </a:lvl1pPr>
+            <a:lvl2pPr marL="457200" algn="l" defTabSz="914400" rtl="0" eaLnBrk="1" latinLnBrk="0" hangingPunct="1">
+              <a:defRPr sz="1800" kern="1200">
+                <a:solidFill>
+                  <a:schemeClr val="tx1"/>
+                </a:solidFill>
+                <a:latin typeface="+mn-lt"/>
+                <a:ea typeface="+mn-ea"/>
+                <a:cs typeface="+mn-cs"/>
+              </a:defRPr>
+            </a:lvl2pPr>
+            <a:lvl3pPr marL="914400" algn="l" defTabSz="914400" rtl="0" eaLnBrk="1" latinLnBrk="0" hangingPunct="1">
+              <a:defRPr sz="1800" kern="1200">
+                <a:solidFill>
+                  <a:schemeClr val="tx1"/>
+                </a:solidFill>
+                <a:latin typeface="+mn-lt"/>
+                <a:ea typeface="+mn-ea"/>
+                <a:cs typeface="+mn-cs"/>
+              </a:defRPr>
+            </a:lvl3pPr>
+            <a:lvl4pPr marL="1371600" algn="l" defTabSz="914400" rtl="0" eaLnBrk="1" latinLnBrk="0" hangingPunct="1">
+              <a:defRPr sz="1800" kern="1200">
+                <a:solidFill>
+                  <a:schemeClr val="tx1"/>
+                </a:solidFill>
+                <a:latin typeface="+mn-lt"/>
+                <a:ea typeface="+mn-ea"/>
+                <a:cs typeface="+mn-cs"/>
+              </a:defRPr>
+            </a:lvl4pPr>
+            <a:lvl5pPr marL="1828800" algn="l" defTabSz="914400" rtl="0" eaLnBrk="1" latinLnBrk="0" hangingPunct="1">
+              <a:defRPr sz="1800" kern="1200">
+                <a:solidFill>
+                  <a:schemeClr val="tx1"/>
+                </a:solidFill>
+                <a:latin typeface="+mn-lt"/>
+                <a:ea typeface="+mn-ea"/>
+                <a:cs typeface="+mn-cs"/>
+              </a:defRPr>
+            </a:lvl5pPr>
+            <a:lvl6pPr marL="2286000" algn="l" defTabSz="914400" rtl="0" eaLnBrk="1" latinLnBrk="0" hangingPunct="1">
+              <a:defRPr sz="1800" kern="1200">
+                <a:solidFill>
+                  <a:schemeClr val="tx1"/>
+                </a:solidFill>
+                <a:latin typeface="+mn-lt"/>
+                <a:ea typeface="+mn-ea"/>
+                <a:cs typeface="+mn-cs"/>
+              </a:defRPr>
+            </a:lvl6pPr>
+            <a:lvl7pPr marL="2743200" algn="l" defTabSz="914400" rtl="0" eaLnBrk="1" latinLnBrk="0" hangingPunct="1">
+              <a:defRPr sz="1800" kern="1200">
+                <a:solidFill>
+                  <a:schemeClr val="tx1"/>
+                </a:solidFill>
+                <a:latin typeface="+mn-lt"/>
+                <a:ea typeface="+mn-ea"/>
+                <a:cs typeface="+mn-cs"/>
+              </a:defRPr>
+            </a:lvl7pPr>
+            <a:lvl8pPr marL="3200400" algn="l" defTabSz="914400" rtl="0" eaLnBrk="1" latinLnBrk="0" hangingPunct="1">
+              <a:defRPr sz="1800" kern="1200">
+                <a:solidFill>
+                  <a:schemeClr val="tx1"/>
+                </a:solidFill>
+                <a:latin typeface="+mn-lt"/>
+                <a:ea typeface="+mn-ea"/>
+                <a:cs typeface="+mn-cs"/>
+              </a:defRPr>
+            </a:lvl8pPr>
+            <a:lvl9pPr marL="3657600" algn="l" defTabSz="914400" rtl="0" eaLnBrk="1" latinLnBrk="0" hangingPunct="1">
+              <a:defRPr sz="1800" kern="1200">
+                <a:solidFill>
+                  <a:schemeClr val="tx1"/>
+                </a:solidFill>
+                <a:latin typeface="+mn-lt"/>
+                <a:ea typeface="+mn-ea"/>
+                <a:cs typeface="+mn-cs"/>
+              </a:defRPr>
+            </a:lvl9pPr>
+          </a:lstStyle>
+          <a:p>
+            <a:pPr marL="274157" indent="-274157" defTabSz="685800">
+              <a:buClrTx/>
+            </a:pPr>
+            <a:r>
+              <a:rPr lang="en-GB" sz="554" dirty="0">
+                <a:solidFill>
+                  <a:srgbClr val="00B050"/>
+                </a:solidFill>
+                <a:latin typeface="Arial"/>
+              </a:rPr>
+              <a:t>Test footer</a:t>
+            </a:r>
+          </a:p>
+        </p:txBody>
+      </p:sp>
+    </p:spTree>
+    <p:custDataLst>
+      <p:tags r:id="rId1"/>
+    </p:custDataLst>
+    <p:extLst>
+      <p:ext uri="{BB962C8B-B14F-4D97-AF65-F5344CB8AC3E}">
+        <p14:creationId xmlns:p14="http://schemas.microsoft.com/office/powerpoint/2010/main" val="2494080787"/>
+      </p:ext>
+    </p:extLst>
+  </p:cSld>
+  <p:clrMapOvr>
+    <a:masterClrMapping/>
+  </p:clrMapOvr>
+</p:sld>
+</file>
+
+<file path=ppt/tags/tag1.xml><?xml version="1.0" encoding="utf-8"?>
+<p:tagLst xmlns:a="http://schemas.openxmlformats.org/drawingml/2006/main" xmlns:r="http://schemas.openxmlformats.org/officeDocument/2006/relationships" xmlns:p="http://schemas.openxmlformats.org/presentationml/2006/main">
+  <p:tag name="THINKCELLSHAPEDONOTDELETE" val="thinkcellActiveDocDoNotDelete"/>
+</p:tagLst>
+</file>
+
+<file path=ppt/tags/tag2.xml><?xml version="1.0" encoding="utf-8"?>
+<p:tagLst xmlns:a="http://schemas.openxmlformats.org/drawingml/2006/main" xmlns:r="http://schemas.openxmlformats.org/officeDocument/2006/relationships" xmlns:p="http://schemas.openxmlformats.org/presentationml/2006/main">
+  <p:tag name="THINKCELLSHAPEDONOTDELETE" val="tvef67Qf2Qji_mD8vTQ5N0w"/>
+</p:tagLst>
+</file>
+
+<file path=ppt/tags/tag3.xml><?xml version="1.0" encoding="utf-8"?>
+<p:tagLst xmlns:a="http://schemas.openxmlformats.org/drawingml/2006/main" xmlns:r="http://schemas.openxmlformats.org/officeDocument/2006/relationships" xmlns:p="http://schemas.openxmlformats.org/presentationml/2006/main">
+  <p:tag name="MONE_MU_STRAIGHT CONNECTOR 14" val="Top=357.1569|Left=40.61465|Width=698.5853|Height=0"/>
+  <p:tag name="MONE_MU_STRAIGHT CONNECTOR 13" val="Top=214.1682|Left=40.61465|Width=698.5853|Height=3.005197"/>
+  <p:tag name="MONE_MU_SOURCE" val="Top=501.7615|Left=40.8|Width=601.1251|Height=13.74709|FontName=Arial|FontSize=8"/>
+  <p:tag name="MONE_MU_CONTENT PLACEHOLDER 11" val="Top=375.0983|Left=426.6142|Width=311.5276|Height=122.0422|FontName=Arial|FontSize=12"/>
+  <p:tag name="MONE_MU_CONTENT PLACEHOLDER 10" val="Top=235.1147|Left=426.6142|Width=311.5276|Height=122.0422|FontName=Arial|FontSize=12"/>
+  <p:tag name="MONE_MU_CONTENT PLACEHOLDER 9" val="Top=404.0117|Left=40.59457|Width=348.0945|Height=93.12882|FontName=Arial|FontSize=14"/>
+  <p:tag name="MONE_MU_TEXT PLACEHOLDER 8" val="Top=375.0983|Left=40.59449|Width=348.75|Height=22.67717|FontName=Arial|FontSize=14"/>
+  <p:tag name="MONE_MU_CONTENT PLACEHOLDER 7" val="Top=264.0281|Left=41.25|Width=348.0945|Height=93.12882|FontName=Arial|FontSize=14"/>
+  <p:tag name="MONE_MU_TEXT PLACEHOLDER 6" val="Top=235.1147|Left=41.24992|Width=348.75|Height=22.67717|FontName=Arial|FontSize=14"/>
+  <p:tag name="MONE_MU_CONTENT PLACEHOLDER 5" val="Top=92.12598|Left=426.6142|Width=311.5276|Height=122.0422|FontName=Arial|FontSize=12"/>
+  <p:tag name="MONE_MU_CONTENT PLACEHOLDER 3" val="Top=121.0394|Left=41.25|Width=348.0945|Height=93.12882|FontName=Arial|FontSize=14"/>
+  <p:tag name="MONE_MU_TEXT PLACEHOLDER 4" val="Top=92.12598|Left=41.24992|Width=348.75|Height=22.67717|FontName=Arial|FontSize=14"/>
+  <p:tag name="MONE_MU_TITLE 2" val="Top=14.97898|Left=40.8|Width=698.4|Height=46.7374|FontName=Arial|FontSize=18"/>
+</p:tagLst>
 </file>
 
 <file path=ppt/theme/theme1.xml><?xml version="1.0" encoding="utf-8"?>
@@ -2877,6 +5443,638 @@
 </file>
 
 <file path=ppt/theme/theme2.xml><?xml version="1.0" encoding="utf-8"?>
+<a:theme xmlns:a="http://schemas.openxmlformats.org/drawingml/2006/main" name="~2997995">
+  <a:themeElements>
+    <a:clrScheme name="PwC Orange">
+      <a:dk1>
+        <a:srgbClr val="000000"/>
+      </a:dk1>
+      <a:lt1>
+        <a:srgbClr val="FFFFFF"/>
+      </a:lt1>
+      <a:dk2>
+        <a:srgbClr val="DC6900"/>
+      </a:dk2>
+      <a:lt2>
+        <a:srgbClr val="FFFFFF"/>
+      </a:lt2>
+      <a:accent1>
+        <a:srgbClr val="DC6900"/>
+      </a:accent1>
+      <a:accent2>
+        <a:srgbClr val="FFB600"/>
+      </a:accent2>
+      <a:accent3>
+        <a:srgbClr val="602320"/>
+      </a:accent3>
+      <a:accent4>
+        <a:srgbClr val="DB536A"/>
+      </a:accent4>
+      <a:accent5>
+        <a:srgbClr val="A32020"/>
+      </a:accent5>
+      <a:accent6>
+        <a:srgbClr val="E0301E"/>
+      </a:accent6>
+      <a:hlink>
+        <a:srgbClr val="DC6900"/>
+      </a:hlink>
+      <a:folHlink>
+        <a:srgbClr val="DC6900"/>
+      </a:folHlink>
+    </a:clrScheme>
+    <a:fontScheme name="PwC">
+      <a:majorFont>
+        <a:latin typeface="Georgia"/>
+        <a:ea typeface=""/>
+        <a:cs typeface=""/>
+      </a:majorFont>
+      <a:minorFont>
+        <a:latin typeface="Arial"/>
+        <a:ea typeface=""/>
+        <a:cs typeface=""/>
+      </a:minorFont>
+    </a:fontScheme>
+    <a:fmtScheme name="Office">
+      <a:fillStyleLst>
+        <a:solidFill>
+          <a:schemeClr val="phClr"/>
+        </a:solidFill>
+        <a:gradFill rotWithShape="1">
+          <a:gsLst>
+            <a:gs pos="0">
+              <a:schemeClr val="phClr">
+                <a:tint val="50000"/>
+                <a:satMod val="300000"/>
+              </a:schemeClr>
+            </a:gs>
+            <a:gs pos="35000">
+              <a:schemeClr val="phClr">
+                <a:tint val="37000"/>
+                <a:satMod val="300000"/>
+              </a:schemeClr>
+            </a:gs>
+            <a:gs pos="100000">
+              <a:schemeClr val="phClr">
+                <a:tint val="15000"/>
+                <a:satMod val="350000"/>
+              </a:schemeClr>
+            </a:gs>
+          </a:gsLst>
+          <a:lin ang="16200000" scaled="1"/>
+        </a:gradFill>
+        <a:gradFill rotWithShape="1">
+          <a:gsLst>
+            <a:gs pos="0">
+              <a:schemeClr val="phClr">
+                <a:shade val="51000"/>
+                <a:satMod val="130000"/>
+              </a:schemeClr>
+            </a:gs>
+            <a:gs pos="80000">
+              <a:schemeClr val="phClr">
+                <a:shade val="93000"/>
+                <a:satMod val="130000"/>
+              </a:schemeClr>
+            </a:gs>
+            <a:gs pos="100000">
+              <a:schemeClr val="phClr">
+                <a:shade val="94000"/>
+                <a:satMod val="135000"/>
+              </a:schemeClr>
+            </a:gs>
+          </a:gsLst>
+          <a:lin ang="16200000" scaled="0"/>
+        </a:gradFill>
+      </a:fillStyleLst>
+      <a:lnStyleLst>
+        <a:ln w="9525" cap="flat" cmpd="sng" algn="ctr">
+          <a:solidFill>
+            <a:schemeClr val="phClr">
+              <a:shade val="95000"/>
+              <a:satMod val="105000"/>
+            </a:schemeClr>
+          </a:solidFill>
+          <a:prstDash val="solid"/>
+        </a:ln>
+        <a:ln w="25400" cap="flat" cmpd="sng" algn="ctr">
+          <a:solidFill>
+            <a:schemeClr val="phClr"/>
+          </a:solidFill>
+          <a:prstDash val="solid"/>
+        </a:ln>
+        <a:ln w="38100" cap="flat" cmpd="sng" algn="ctr">
+          <a:solidFill>
+            <a:schemeClr val="phClr"/>
+          </a:solidFill>
+          <a:prstDash val="solid"/>
+        </a:ln>
+      </a:lnStyleLst>
+      <a:effectStyleLst>
+        <a:effectStyle>
+          <a:effectLst>
+            <a:outerShdw blurRad="40000" dist="20000" dir="5400000" rotWithShape="0">
+              <a:srgbClr val="000000">
+                <a:alpha val="38000"/>
+              </a:srgbClr>
+            </a:outerShdw>
+          </a:effectLst>
+        </a:effectStyle>
+        <a:effectStyle>
+          <a:effectLst>
+            <a:outerShdw blurRad="40000" dist="23000" dir="5400000" rotWithShape="0">
+              <a:srgbClr val="000000">
+                <a:alpha val="35000"/>
+              </a:srgbClr>
+            </a:outerShdw>
+          </a:effectLst>
+        </a:effectStyle>
+        <a:effectStyle>
+          <a:effectLst>
+            <a:outerShdw blurRad="40000" dist="23000" dir="5400000" rotWithShape="0">
+              <a:srgbClr val="000000">
+                <a:alpha val="35000"/>
+              </a:srgbClr>
+            </a:outerShdw>
+          </a:effectLst>
+          <a:scene3d>
+            <a:camera prst="orthographicFront">
+              <a:rot lat="0" lon="0" rev="0"/>
+            </a:camera>
+            <a:lightRig rig="threePt" dir="t">
+              <a:rot lat="0" lon="0" rev="1200000"/>
+            </a:lightRig>
+          </a:scene3d>
+          <a:sp3d>
+            <a:bevelT w="63500" h="25400"/>
+          </a:sp3d>
+        </a:effectStyle>
+      </a:effectStyleLst>
+      <a:bgFillStyleLst>
+        <a:solidFill>
+          <a:schemeClr val="phClr"/>
+        </a:solidFill>
+        <a:gradFill rotWithShape="1">
+          <a:gsLst>
+            <a:gs pos="0">
+              <a:schemeClr val="phClr">
+                <a:tint val="40000"/>
+                <a:satMod val="350000"/>
+              </a:schemeClr>
+            </a:gs>
+            <a:gs pos="40000">
+              <a:schemeClr val="phClr">
+                <a:tint val="45000"/>
+                <a:shade val="99000"/>
+                <a:satMod val="350000"/>
+              </a:schemeClr>
+            </a:gs>
+            <a:gs pos="100000">
+              <a:schemeClr val="phClr">
+                <a:shade val="20000"/>
+                <a:satMod val="255000"/>
+              </a:schemeClr>
+            </a:gs>
+          </a:gsLst>
+          <a:path path="circle">
+            <a:fillToRect l="50000" t="-80000" r="50000" b="180000"/>
+          </a:path>
+        </a:gradFill>
+        <a:gradFill rotWithShape="1">
+          <a:gsLst>
+            <a:gs pos="0">
+              <a:schemeClr val="phClr">
+                <a:tint val="80000"/>
+                <a:satMod val="300000"/>
+              </a:schemeClr>
+            </a:gs>
+            <a:gs pos="100000">
+              <a:schemeClr val="phClr">
+                <a:shade val="30000"/>
+                <a:satMod val="200000"/>
+              </a:schemeClr>
+            </a:gs>
+          </a:gsLst>
+          <a:path path="circle">
+            <a:fillToRect l="50000" t="50000" r="50000" b="50000"/>
+          </a:path>
+        </a:gradFill>
+      </a:bgFillStyleLst>
+    </a:fmtScheme>
+  </a:themeElements>
+  <a:objectDefaults>
+    <a:spDef>
+      <a:spPr bwMode="ltGray">
+        <a:solidFill>
+          <a:schemeClr val="tx2"/>
+        </a:solidFill>
+        <a:ln w="3175">
+          <a:solidFill>
+            <a:schemeClr val="tx2"/>
+          </a:solidFill>
+        </a:ln>
+      </a:spPr>
+      <a:bodyPr rtlCol="0" anchor="ctr"/>
+      <a:lstStyle>
+        <a:defPPr algn="ctr">
+          <a:defRPr dirty="0" err="1" smtClean="0">
+            <a:solidFill>
+              <a:schemeClr val="bg1"/>
+            </a:solidFill>
+            <a:latin typeface="Georgia" pitchFamily="18" charset="0"/>
+          </a:defRPr>
+        </a:defPPr>
+      </a:lstStyle>
+      <a:style>
+        <a:lnRef idx="2">
+          <a:schemeClr val="accent1">
+            <a:shade val="50000"/>
+          </a:schemeClr>
+        </a:lnRef>
+        <a:fillRef idx="1">
+          <a:schemeClr val="accent1"/>
+        </a:fillRef>
+        <a:effectRef idx="0">
+          <a:schemeClr val="accent1"/>
+        </a:effectRef>
+        <a:fontRef idx="minor">
+          <a:schemeClr val="lt1"/>
+        </a:fontRef>
+      </a:style>
+    </a:spDef>
+    <a:txDef>
+      <a:spPr>
+        <a:noFill/>
+      </a:spPr>
+      <a:bodyPr wrap="none" lIns="0" tIns="0" rIns="0" bIns="0" rtlCol="0">
+        <a:noAutofit/>
+      </a:bodyPr>
+      <a:lstStyle>
+        <a:defPPr>
+          <a:spcAft>
+            <a:spcPts val="900"/>
+          </a:spcAft>
+          <a:defRPr sz="2000" dirty="0" smtClean="0">
+            <a:latin typeface="Georgia" pitchFamily="18" charset="0"/>
+          </a:defRPr>
+        </a:defPPr>
+      </a:lstStyle>
+    </a:txDef>
+  </a:objectDefaults>
+  <a:extraClrSchemeLst/>
+</a:theme>
+</file>
+
+<file path=ppt/theme/theme3.xml><?xml version="1.0" encoding="utf-8"?>
+<a:theme xmlns:a="http://schemas.openxmlformats.org/drawingml/2006/main" name="Blank">
+  <a:themeElements>
+    <a:clrScheme name="ATK Color 2012_01">
+      <a:dk1>
+        <a:srgbClr val="000000"/>
+      </a:dk1>
+      <a:lt1>
+        <a:srgbClr val="FFFFFF"/>
+      </a:lt1>
+      <a:dk2>
+        <a:srgbClr val="778242"/>
+      </a:dk2>
+      <a:lt2>
+        <a:srgbClr val="9B1717"/>
+      </a:lt2>
+      <a:accent1>
+        <a:srgbClr val="364086"/>
+      </a:accent1>
+      <a:accent2>
+        <a:srgbClr val="EFEEEC"/>
+      </a:accent2>
+      <a:accent3>
+        <a:srgbClr val="ADABA1"/>
+      </a:accent3>
+      <a:accent4>
+        <a:srgbClr val="858274"/>
+      </a:accent4>
+      <a:accent5>
+        <a:srgbClr val="FCA248"/>
+      </a:accent5>
+      <a:accent6>
+        <a:srgbClr val="CDD773"/>
+      </a:accent6>
+      <a:hlink>
+        <a:srgbClr val="364086"/>
+      </a:hlink>
+      <a:folHlink>
+        <a:srgbClr val="A3AADA"/>
+      </a:folHlink>
+    </a:clrScheme>
+    <a:fontScheme name="ATK Font 2012_01">
+      <a:majorFont>
+        <a:latin typeface="Arial"/>
+        <a:ea typeface=""/>
+        <a:cs typeface=""/>
+      </a:majorFont>
+      <a:minorFont>
+        <a:latin typeface="Arial"/>
+        <a:ea typeface=""/>
+        <a:cs typeface=""/>
+      </a:minorFont>
+    </a:fontScheme>
+    <a:fmtScheme name="Office">
+      <a:fillStyleLst>
+        <a:solidFill>
+          <a:schemeClr val="phClr"/>
+        </a:solidFill>
+        <a:gradFill rotWithShape="1">
+          <a:gsLst>
+            <a:gs pos="0">
+              <a:schemeClr val="phClr">
+                <a:tint val="50000"/>
+                <a:satMod val="300000"/>
+              </a:schemeClr>
+            </a:gs>
+            <a:gs pos="35000">
+              <a:schemeClr val="phClr">
+                <a:tint val="37000"/>
+                <a:satMod val="300000"/>
+              </a:schemeClr>
+            </a:gs>
+            <a:gs pos="100000">
+              <a:schemeClr val="phClr">
+                <a:tint val="15000"/>
+                <a:satMod val="350000"/>
+              </a:schemeClr>
+            </a:gs>
+          </a:gsLst>
+          <a:lin ang="16200000" scaled="1"/>
+        </a:gradFill>
+        <a:gradFill rotWithShape="1">
+          <a:gsLst>
+            <a:gs pos="0">
+              <a:schemeClr val="phClr">
+                <a:shade val="51000"/>
+                <a:satMod val="130000"/>
+              </a:schemeClr>
+            </a:gs>
+            <a:gs pos="80000">
+              <a:schemeClr val="phClr">
+                <a:shade val="93000"/>
+                <a:satMod val="130000"/>
+              </a:schemeClr>
+            </a:gs>
+            <a:gs pos="100000">
+              <a:schemeClr val="phClr">
+                <a:shade val="94000"/>
+                <a:satMod val="135000"/>
+              </a:schemeClr>
+            </a:gs>
+          </a:gsLst>
+          <a:lin ang="16200000" scaled="0"/>
+        </a:gradFill>
+      </a:fillStyleLst>
+      <a:lnStyleLst>
+        <a:ln w="9525" cap="flat" cmpd="sng" algn="ctr">
+          <a:solidFill>
+            <a:schemeClr val="phClr">
+              <a:shade val="95000"/>
+              <a:satMod val="105000"/>
+            </a:schemeClr>
+          </a:solidFill>
+          <a:prstDash val="solid"/>
+        </a:ln>
+        <a:ln w="25400" cap="flat" cmpd="sng" algn="ctr">
+          <a:solidFill>
+            <a:schemeClr val="phClr"/>
+          </a:solidFill>
+          <a:prstDash val="solid"/>
+        </a:ln>
+        <a:ln w="38100" cap="flat" cmpd="sng" algn="ctr">
+          <a:solidFill>
+            <a:schemeClr val="phClr"/>
+          </a:solidFill>
+          <a:prstDash val="solid"/>
+        </a:ln>
+      </a:lnStyleLst>
+      <a:effectStyleLst>
+        <a:effectStyle>
+          <a:effectLst>
+            <a:outerShdw blurRad="40000" dist="20000" dir="5400000" rotWithShape="0">
+              <a:srgbClr val="000000">
+                <a:alpha val="38000"/>
+              </a:srgbClr>
+            </a:outerShdw>
+          </a:effectLst>
+        </a:effectStyle>
+        <a:effectStyle>
+          <a:effectLst>
+            <a:outerShdw blurRad="40000" dist="23000" dir="5400000" rotWithShape="0">
+              <a:srgbClr val="000000">
+                <a:alpha val="35000"/>
+              </a:srgbClr>
+            </a:outerShdw>
+          </a:effectLst>
+        </a:effectStyle>
+        <a:effectStyle>
+          <a:effectLst>
+            <a:outerShdw blurRad="40000" dist="23000" dir="5400000" rotWithShape="0">
+              <a:srgbClr val="000000">
+                <a:alpha val="35000"/>
+              </a:srgbClr>
+            </a:outerShdw>
+          </a:effectLst>
+          <a:scene3d>
+            <a:camera prst="orthographicFront">
+              <a:rot lat="0" lon="0" rev="0"/>
+            </a:camera>
+            <a:lightRig rig="threePt" dir="t">
+              <a:rot lat="0" lon="0" rev="1200000"/>
+            </a:lightRig>
+          </a:scene3d>
+          <a:sp3d>
+            <a:bevelT w="63500" h="25400"/>
+          </a:sp3d>
+        </a:effectStyle>
+      </a:effectStyleLst>
+      <a:bgFillStyleLst>
+        <a:solidFill>
+          <a:schemeClr val="phClr"/>
+        </a:solidFill>
+        <a:gradFill rotWithShape="1">
+          <a:gsLst>
+            <a:gs pos="0">
+              <a:schemeClr val="phClr">
+                <a:tint val="40000"/>
+                <a:satMod val="350000"/>
+              </a:schemeClr>
+            </a:gs>
+            <a:gs pos="40000">
+              <a:schemeClr val="phClr">
+                <a:tint val="45000"/>
+                <a:shade val="99000"/>
+                <a:satMod val="350000"/>
+              </a:schemeClr>
+            </a:gs>
+            <a:gs pos="100000">
+              <a:schemeClr val="phClr">
+                <a:shade val="20000"/>
+                <a:satMod val="255000"/>
+              </a:schemeClr>
+            </a:gs>
+          </a:gsLst>
+          <a:path path="circle">
+            <a:fillToRect l="50000" t="-80000" r="50000" b="180000"/>
+          </a:path>
+        </a:gradFill>
+        <a:gradFill rotWithShape="1">
+          <a:gsLst>
+            <a:gs pos="0">
+              <a:schemeClr val="phClr">
+                <a:tint val="80000"/>
+                <a:satMod val="300000"/>
+              </a:schemeClr>
+            </a:gs>
+            <a:gs pos="100000">
+              <a:schemeClr val="phClr">
+                <a:shade val="30000"/>
+                <a:satMod val="200000"/>
+              </a:schemeClr>
+            </a:gs>
+          </a:gsLst>
+          <a:path path="circle">
+            <a:fillToRect l="50000" t="50000" r="50000" b="50000"/>
+          </a:path>
+        </a:gradFill>
+      </a:bgFillStyleLst>
+    </a:fmtScheme>
+  </a:themeElements>
+  <a:objectDefaults>
+    <a:spDef>
+      <a:spPr>
+        <a:solidFill>
+          <a:schemeClr val="accent3"/>
+        </a:solidFill>
+        <a:ln w="6350" cap="flat">
+          <a:noFill/>
+          <a:miter lim="800000"/>
+        </a:ln>
+      </a:spPr>
+      <a:bodyPr rot="0" spcFirstLastPara="0" vertOverflow="overflow" horzOverflow="overflow" vert="horz" wrap="square" lIns="73152" tIns="73152" rIns="73152" bIns="73152" numCol="1" spcCol="0" rtlCol="0" fromWordArt="0" anchor="ctr" anchorCtr="0" forceAA="0" compatLnSpc="1">
+        <a:prstTxWarp prst="textNoShape">
+          <a:avLst/>
+        </a:prstTxWarp>
+        <a:noAutofit/>
+      </a:bodyPr>
+      <a:lstStyle>
+        <a:defPPr algn="ctr">
+          <a:lnSpc>
+            <a:spcPct val="90000"/>
+          </a:lnSpc>
+          <a:spcBef>
+            <a:spcPts val="900"/>
+          </a:spcBef>
+          <a:defRPr sz="1400" dirty="0" err="1" smtClean="0">
+            <a:solidFill>
+              <a:schemeClr val="bg1"/>
+            </a:solidFill>
+            <a:latin typeface="Arial" pitchFamily="34" charset="0"/>
+            <a:cs typeface="Arial" pitchFamily="34" charset="0"/>
+          </a:defRPr>
+        </a:defPPr>
+      </a:lstStyle>
+      <a:style>
+        <a:lnRef idx="2">
+          <a:schemeClr val="accent1">
+            <a:shade val="50000"/>
+          </a:schemeClr>
+        </a:lnRef>
+        <a:fillRef idx="1">
+          <a:schemeClr val="accent1"/>
+        </a:fillRef>
+        <a:effectRef idx="0">
+          <a:schemeClr val="accent1"/>
+        </a:effectRef>
+        <a:fontRef idx="minor">
+          <a:schemeClr val="lt1"/>
+        </a:fontRef>
+      </a:style>
+    </a:spDef>
+    <a:lnDef>
+      <a:spPr>
+        <a:ln w="6350" cap="flat">
+          <a:solidFill>
+            <a:schemeClr val="accent3"/>
+          </a:solidFill>
+          <a:miter lim="800000"/>
+          <a:headEnd type="none" w="med" len="med"/>
+          <a:tailEnd type="none" w="med" len="med"/>
+        </a:ln>
+      </a:spPr>
+      <a:bodyPr/>
+      <a:lstStyle/>
+      <a:style>
+        <a:lnRef idx="1">
+          <a:schemeClr val="accent1"/>
+        </a:lnRef>
+        <a:fillRef idx="0">
+          <a:schemeClr val="accent1"/>
+        </a:fillRef>
+        <a:effectRef idx="0">
+          <a:schemeClr val="accent1"/>
+        </a:effectRef>
+        <a:fontRef idx="minor">
+          <a:schemeClr val="tx1"/>
+        </a:fontRef>
+      </a:style>
+    </a:lnDef>
+    <a:txDef>
+      <a:spPr>
+        <a:noFill/>
+        <a:ln w="6350" cap="flat">
+          <a:noFill/>
+          <a:miter lim="800000"/>
+        </a:ln>
+      </a:spPr>
+      <a:bodyPr wrap="none" lIns="0" tIns="0" rIns="0" bIns="0" rtlCol="0" anchor="t" anchorCtr="0">
+        <a:spAutoFit/>
+      </a:bodyPr>
+      <a:lstStyle>
+        <a:defPPr>
+          <a:lnSpc>
+            <a:spcPct val="90000"/>
+          </a:lnSpc>
+          <a:spcBef>
+            <a:spcPts val="600"/>
+          </a:spcBef>
+          <a:buClr>
+            <a:schemeClr val="bg2"/>
+          </a:buClr>
+          <a:defRPr sz="1400" dirty="0" smtClean="0">
+            <a:latin typeface="Arial" pitchFamily="34" charset="0"/>
+            <a:cs typeface="Arial" pitchFamily="34" charset="0"/>
+          </a:defRPr>
+        </a:defPPr>
+      </a:lstStyle>
+    </a:txDef>
+  </a:objectDefaults>
+  <a:extraClrSchemeLst/>
+  <a:custClrLst>
+    <a:custClr name="Custom Color 1">
+      <a:srgbClr val="9B1717"/>
+    </a:custClr>
+    <a:custClr name="Custom Color 2">
+      <a:srgbClr val="DCDC00"/>
+    </a:custClr>
+    <a:custClr name="Custom Color 3">
+      <a:srgbClr val="289055"/>
+    </a:custClr>
+  </a:custClrLst>
+  <a:extLst>
+    <a:ext uri="{05A4C25C-085E-4340-85A3-A5531E510DB2}">
+      <thm15:themeFamily xmlns:thm15="http://schemas.microsoft.com/office/thememl/2012/main" name="Blank.potx" id="{91F21275-7830-497D-B741-EE12799FC331}" vid="{B781696D-5232-4FA7-BDC5-864874AC5D4C}"/>
+    </a:ext>
+  </a:extLst>
+</a:theme>
+</file>
+
+<file path=ppt/theme/theme4.xml><?xml version="1.0" encoding="utf-8"?>
 <a:theme xmlns:a="http://schemas.openxmlformats.org/drawingml/2006/main">
   <a:themeElements>
     <a:clrScheme name="Default">

</xml_diff>